<commit_message>
User Stories e Testes de Aceitação - 08,07,05,04
</commit_message>
<xml_diff>
--- a/GestaoFinancaPessoal/GestaoFinancaPessoal/Documentos/Entrega-02/TestesAceitaçãoUS07.pptx
+++ b/GestaoFinancaPessoal/GestaoFinancaPessoal/Documentos/Entrega-02/TestesAceitaçãoUS07.pptx
@@ -107,6 +107,11 @@
       </a:defRPr>
     </a:lvl9pPr>
   </p:defaultTextStyle>
+  <p:extLst>
+    <p:ext uri="{EFAFB233-063F-42B5-8137-9DF3F51BA10A}">
+      <p15:sldGuideLst xmlns:p15="http://schemas.microsoft.com/office/powerpoint/2012/main"/>
+    </p:ext>
+  </p:extLst>
 </p:presentation>
 </file>
 
@@ -257,7 +262,7 @@
           <a:p>
             <a:fld id="{0F25DA31-97F7-4E81-9F1C-21BD9511E004}" type="datetimeFigureOut">
               <a:rPr lang="pt-BR" smtClean="0"/>
-              <a:t>05/05/2019</a:t>
+              <a:t>06/05/2019</a:t>
             </a:fld>
             <a:endParaRPr lang="pt-BR"/>
           </a:p>
@@ -455,7 +460,7 @@
           <a:p>
             <a:fld id="{0F25DA31-97F7-4E81-9F1C-21BD9511E004}" type="datetimeFigureOut">
               <a:rPr lang="pt-BR" smtClean="0"/>
-              <a:t>05/05/2019</a:t>
+              <a:t>06/05/2019</a:t>
             </a:fld>
             <a:endParaRPr lang="pt-BR"/>
           </a:p>
@@ -663,7 +668,7 @@
           <a:p>
             <a:fld id="{0F25DA31-97F7-4E81-9F1C-21BD9511E004}" type="datetimeFigureOut">
               <a:rPr lang="pt-BR" smtClean="0"/>
-              <a:t>05/05/2019</a:t>
+              <a:t>06/05/2019</a:t>
             </a:fld>
             <a:endParaRPr lang="pt-BR"/>
           </a:p>
@@ -861,7 +866,7 @@
           <a:p>
             <a:fld id="{0F25DA31-97F7-4E81-9F1C-21BD9511E004}" type="datetimeFigureOut">
               <a:rPr lang="pt-BR" smtClean="0"/>
-              <a:t>05/05/2019</a:t>
+              <a:t>06/05/2019</a:t>
             </a:fld>
             <a:endParaRPr lang="pt-BR"/>
           </a:p>
@@ -1136,7 +1141,7 @@
           <a:p>
             <a:fld id="{0F25DA31-97F7-4E81-9F1C-21BD9511E004}" type="datetimeFigureOut">
               <a:rPr lang="pt-BR" smtClean="0"/>
-              <a:t>05/05/2019</a:t>
+              <a:t>06/05/2019</a:t>
             </a:fld>
             <a:endParaRPr lang="pt-BR"/>
           </a:p>
@@ -1401,7 +1406,7 @@
           <a:p>
             <a:fld id="{0F25DA31-97F7-4E81-9F1C-21BD9511E004}" type="datetimeFigureOut">
               <a:rPr lang="pt-BR" smtClean="0"/>
-              <a:t>05/05/2019</a:t>
+              <a:t>06/05/2019</a:t>
             </a:fld>
             <a:endParaRPr lang="pt-BR"/>
           </a:p>
@@ -1813,7 +1818,7 @@
           <a:p>
             <a:fld id="{0F25DA31-97F7-4E81-9F1C-21BD9511E004}" type="datetimeFigureOut">
               <a:rPr lang="pt-BR" smtClean="0"/>
-              <a:t>05/05/2019</a:t>
+              <a:t>06/05/2019</a:t>
             </a:fld>
             <a:endParaRPr lang="pt-BR"/>
           </a:p>
@@ -1954,7 +1959,7 @@
           <a:p>
             <a:fld id="{0F25DA31-97F7-4E81-9F1C-21BD9511E004}" type="datetimeFigureOut">
               <a:rPr lang="pt-BR" smtClean="0"/>
-              <a:t>05/05/2019</a:t>
+              <a:t>06/05/2019</a:t>
             </a:fld>
             <a:endParaRPr lang="pt-BR"/>
           </a:p>
@@ -2067,7 +2072,7 @@
           <a:p>
             <a:fld id="{0F25DA31-97F7-4E81-9F1C-21BD9511E004}" type="datetimeFigureOut">
               <a:rPr lang="pt-BR" smtClean="0"/>
-              <a:t>05/05/2019</a:t>
+              <a:t>06/05/2019</a:t>
             </a:fld>
             <a:endParaRPr lang="pt-BR"/>
           </a:p>
@@ -2378,7 +2383,7 @@
           <a:p>
             <a:fld id="{0F25DA31-97F7-4E81-9F1C-21BD9511E004}" type="datetimeFigureOut">
               <a:rPr lang="pt-BR" smtClean="0"/>
-              <a:t>05/05/2019</a:t>
+              <a:t>06/05/2019</a:t>
             </a:fld>
             <a:endParaRPr lang="pt-BR"/>
           </a:p>
@@ -2666,7 +2671,7 @@
           <a:p>
             <a:fld id="{0F25DA31-97F7-4E81-9F1C-21BD9511E004}" type="datetimeFigureOut">
               <a:rPr lang="pt-BR" smtClean="0"/>
-              <a:t>05/05/2019</a:t>
+              <a:t>06/05/2019</a:t>
             </a:fld>
             <a:endParaRPr lang="pt-BR"/>
           </a:p>
@@ -2907,7 +2912,7 @@
           <a:p>
             <a:fld id="{0F25DA31-97F7-4E81-9F1C-21BD9511E004}" type="datetimeFigureOut">
               <a:rPr lang="pt-BR" smtClean="0"/>
-              <a:t>05/05/2019</a:t>
+              <a:t>06/05/2019</a:t>
             </a:fld>
             <a:endParaRPr lang="pt-BR"/>
           </a:p>
@@ -3374,7 +3379,7 @@
           <p:nvPr>
             <p:extLst>
               <p:ext uri="{D42A27DB-BD31-4B8C-83A1-F6EECF244321}">
-                <p14:modId xmlns:p14="http://schemas.microsoft.com/office/powerpoint/2010/main" val="739147340"/>
+                <p14:modId xmlns:p14="http://schemas.microsoft.com/office/powerpoint/2010/main" val="1562331648"/>
               </p:ext>
             </p:extLst>
           </p:nvPr>
@@ -3386,7 +3391,9 @@
         <a:graphic>
           <a:graphicData uri="http://schemas.openxmlformats.org/drawingml/2006/table">
             <a:tbl>
-              <a:tblPr/>
+              <a:tblPr>
+                <a:tableStyleId>{69CF1AB2-1976-4502-BF36-3FF5EA218861}</a:tableStyleId>
+              </a:tblPr>
               <a:tblGrid>
                 <a:gridCol w="2610155">
                   <a:extLst>
@@ -3796,63 +3803,31 @@
                         </a:tabLst>
                       </a:pPr>
                       <a:r>
-                        <a:rPr kumimoji="0" lang="pt-BR" altLang="pt-BR" sz="1100" b="0" i="0" u="none" strike="noStrike" cap="none" normalizeH="0" baseline="0" dirty="0">
+                        <a:rPr kumimoji="0" lang="pt-BR" altLang="pt-BR" sz="1100" u="none" strike="noStrike" cap="none" normalizeH="0" baseline="0" dirty="0">
                           <a:ln>
                             <a:noFill/>
                           </a:ln>
-                          <a:solidFill>
-                            <a:srgbClr val="FFFFFF"/>
-                          </a:solidFill>
                           <a:effectLst/>
                           <a:latin typeface="Arial" panose="020B0604020202020204" pitchFamily="34" charset="0"/>
-                          <a:ea typeface="MS PGothic" panose="020B0600070205080204" pitchFamily="34" charset="-128"/>
                           <a:cs typeface="Arial" panose="020B0604020202020204" pitchFamily="34" charset="0"/>
                         </a:rPr>
                         <a:t>CT07.1 – Editar Notificação sem tempo determinado.</a:t>
                       </a:r>
+                      <a:endParaRPr kumimoji="0" lang="pt-BR" altLang="pt-BR" sz="1100" b="0" i="0" u="none" strike="noStrike" cap="none" normalizeH="0" baseline="0" dirty="0">
+                        <a:ln>
+                          <a:noFill/>
+                        </a:ln>
+                        <a:solidFill>
+                          <a:srgbClr val="FFFFFF"/>
+                        </a:solidFill>
+                        <a:effectLst/>
+                        <a:latin typeface="Arial" panose="020B0604020202020204" pitchFamily="34" charset="0"/>
+                        <a:ea typeface="MS PGothic" panose="020B0600070205080204" pitchFamily="34" charset="-128"/>
+                        <a:cs typeface="Arial" panose="020B0604020202020204" pitchFamily="34" charset="0"/>
+                      </a:endParaRPr>
                     </a:p>
                   </a:txBody>
-                  <a:tcPr marL="53410" marR="53410" marT="29903" marB="27126" horzOverflow="overflow">
-                    <a:lnL w="720" cap="flat" cmpd="sng" algn="ctr">
-                      <a:solidFill>
-                        <a:srgbClr val="FFFFFF"/>
-                      </a:solidFill>
-                      <a:prstDash val="solid"/>
-                      <a:round/>
-                      <a:headEnd type="none" w="med" len="med"/>
-                      <a:tailEnd type="none" w="med" len="med"/>
-                    </a:lnL>
-                    <a:lnR>
-                      <a:noFill/>
-                    </a:lnR>
-                    <a:lnT w="720" cap="flat" cmpd="sng" algn="ctr">
-                      <a:solidFill>
-                        <a:srgbClr val="FFFFFF"/>
-                      </a:solidFill>
-                      <a:prstDash val="solid"/>
-                      <a:round/>
-                      <a:headEnd type="none" w="med" len="med"/>
-                      <a:tailEnd type="none" w="med" len="med"/>
-                    </a:lnT>
-                    <a:lnB w="720" cap="flat" cmpd="sng" algn="ctr">
-                      <a:solidFill>
-                        <a:srgbClr val="FFFFFF"/>
-                      </a:solidFill>
-                      <a:prstDash val="solid"/>
-                      <a:round/>
-                      <a:headEnd type="none" w="med" len="med"/>
-                      <a:tailEnd type="none" w="med" len="med"/>
-                    </a:lnB>
-                    <a:lnTlToBr>
-                      <a:noFill/>
-                    </a:lnTlToBr>
-                    <a:lnBlToTr>
-                      <a:noFill/>
-                    </a:lnBlToTr>
-                    <a:solidFill>
-                      <a:srgbClr val="80B5E2"/>
-                    </a:solidFill>
-                  </a:tcPr>
+                  <a:tcPr marL="53410" marR="53410" marT="29903" marB="27126" horzOverflow="overflow"/>
                 </a:tc>
                 <a:tc hMerge="1">
                   <a:txBody>
@@ -4263,63 +4238,31 @@
                         </a:tabLst>
                       </a:pPr>
                       <a:r>
-                        <a:rPr kumimoji="0" lang="pt-BR" altLang="pt-BR" sz="1100" b="0" i="0" u="none" strike="noStrike" cap="none" normalizeH="0" baseline="0" dirty="0">
+                        <a:rPr kumimoji="0" lang="pt-BR" altLang="pt-BR" sz="1100" u="none" strike="noStrike" cap="none" normalizeH="0" baseline="0" dirty="0">
                           <a:ln>
                             <a:noFill/>
                           </a:ln>
-                          <a:solidFill>
-                            <a:srgbClr val="000000"/>
-                          </a:solidFill>
                           <a:effectLst/>
                           <a:latin typeface="Arial" panose="020B0604020202020204" pitchFamily="34" charset="0"/>
-                          <a:ea typeface="MS PGothic" panose="020B0600070205080204" pitchFamily="34" charset="-128"/>
                           <a:cs typeface="Arial" panose="020B0604020202020204" pitchFamily="34" charset="0"/>
                         </a:rPr>
                         <a:t>Pré-condição: O usuário deve estar autenticado no sistema.</a:t>
                       </a:r>
+                      <a:endParaRPr kumimoji="0" lang="pt-BR" altLang="pt-BR" sz="1100" b="0" i="0" u="none" strike="noStrike" cap="none" normalizeH="0" baseline="0" dirty="0">
+                        <a:ln>
+                          <a:noFill/>
+                        </a:ln>
+                        <a:solidFill>
+                          <a:srgbClr val="000000"/>
+                        </a:solidFill>
+                        <a:effectLst/>
+                        <a:latin typeface="Arial" panose="020B0604020202020204" pitchFamily="34" charset="0"/>
+                        <a:ea typeface="MS PGothic" panose="020B0600070205080204" pitchFamily="34" charset="-128"/>
+                        <a:cs typeface="Arial" panose="020B0604020202020204" pitchFamily="34" charset="0"/>
+                      </a:endParaRPr>
                     </a:p>
                   </a:txBody>
-                  <a:tcPr marL="53410" marR="53410" marT="29903" marB="27126" horzOverflow="overflow">
-                    <a:lnL w="720" cap="flat" cmpd="sng" algn="ctr">
-                      <a:solidFill>
-                        <a:srgbClr val="FFFFFF"/>
-                      </a:solidFill>
-                      <a:prstDash val="solid"/>
-                      <a:round/>
-                      <a:headEnd type="none" w="med" len="med"/>
-                      <a:tailEnd type="none" w="med" len="med"/>
-                    </a:lnL>
-                    <a:lnR>
-                      <a:noFill/>
-                    </a:lnR>
-                    <a:lnT w="720" cap="flat" cmpd="sng" algn="ctr">
-                      <a:solidFill>
-                        <a:srgbClr val="FFFFFF"/>
-                      </a:solidFill>
-                      <a:prstDash val="solid"/>
-                      <a:round/>
-                      <a:headEnd type="none" w="med" len="med"/>
-                      <a:tailEnd type="none" w="med" len="med"/>
-                    </a:lnT>
-                    <a:lnB w="720" cap="flat" cmpd="sng" algn="ctr">
-                      <a:solidFill>
-                        <a:srgbClr val="FFFFFF"/>
-                      </a:solidFill>
-                      <a:prstDash val="solid"/>
-                      <a:round/>
-                      <a:headEnd type="none" w="med" len="med"/>
-                      <a:tailEnd type="none" w="med" len="med"/>
-                    </a:lnB>
-                    <a:lnTlToBr>
-                      <a:noFill/>
-                    </a:lnTlToBr>
-                    <a:lnBlToTr>
-                      <a:noFill/>
-                    </a:lnBlToTr>
-                    <a:solidFill>
-                      <a:srgbClr val="CCD1E1"/>
-                    </a:solidFill>
-                  </a:tcPr>
+                  <a:tcPr marL="53410" marR="53410" marT="29903" marB="27126" horzOverflow="overflow"/>
                 </a:tc>
                 <a:tc hMerge="1">
                   <a:txBody>
@@ -4730,69 +4673,31 @@
                         </a:tabLst>
                       </a:pPr>
                       <a:r>
-                        <a:rPr kumimoji="0" lang="pt-BR" altLang="pt-BR" sz="1100" b="0" i="1" u="none" strike="noStrike" cap="none" normalizeH="0" baseline="0">
+                        <a:rPr kumimoji="0" lang="pt-BR" altLang="pt-BR" sz="1100" u="none" strike="noStrike" cap="none" normalizeH="0" baseline="0">
                           <a:ln>
                             <a:noFill/>
                           </a:ln>
-                          <a:solidFill>
-                            <a:srgbClr val="2469A6"/>
-                          </a:solidFill>
                           <a:effectLst/>
                           <a:latin typeface="Arial" panose="020B0604020202020204" pitchFamily="34" charset="0"/>
-                          <a:ea typeface="MS PGothic" panose="020B0600070205080204" pitchFamily="34" charset="-128"/>
                           <a:cs typeface="Arial" panose="020B0604020202020204" pitchFamily="34" charset="0"/>
                         </a:rPr>
                         <a:t>Procedimentos</a:t>
                       </a:r>
+                      <a:endParaRPr kumimoji="0" lang="pt-BR" altLang="pt-BR" sz="1100" b="0" i="1" u="none" strike="noStrike" cap="none" normalizeH="0" baseline="0">
+                        <a:ln>
+                          <a:noFill/>
+                        </a:ln>
+                        <a:solidFill>
+                          <a:srgbClr val="2469A6"/>
+                        </a:solidFill>
+                        <a:effectLst/>
+                        <a:latin typeface="Arial" panose="020B0604020202020204" pitchFamily="34" charset="0"/>
+                        <a:ea typeface="MS PGothic" panose="020B0600070205080204" pitchFamily="34" charset="-128"/>
+                        <a:cs typeface="Arial" panose="020B0604020202020204" pitchFamily="34" charset="0"/>
+                      </a:endParaRPr>
                     </a:p>
                   </a:txBody>
-                  <a:tcPr marL="53410" marR="53410" marT="29476" marB="27126" horzOverflow="overflow">
-                    <a:lnL w="720" cap="flat" cmpd="sng" algn="ctr">
-                      <a:solidFill>
-                        <a:srgbClr val="FFFFFF"/>
-                      </a:solidFill>
-                      <a:prstDash val="solid"/>
-                      <a:round/>
-                      <a:headEnd type="none" w="med" len="med"/>
-                      <a:tailEnd type="none" w="med" len="med"/>
-                    </a:lnL>
-                    <a:lnR w="720" cap="flat" cmpd="sng" algn="ctr">
-                      <a:solidFill>
-                        <a:srgbClr val="FFFFFF"/>
-                      </a:solidFill>
-                      <a:prstDash val="solid"/>
-                      <a:round/>
-                      <a:headEnd type="none" w="med" len="med"/>
-                      <a:tailEnd type="none" w="med" len="med"/>
-                    </a:lnR>
-                    <a:lnT w="720" cap="flat" cmpd="sng" algn="ctr">
-                      <a:solidFill>
-                        <a:srgbClr val="FFFFFF"/>
-                      </a:solidFill>
-                      <a:prstDash val="solid"/>
-                      <a:round/>
-                      <a:headEnd type="none" w="med" len="med"/>
-                      <a:tailEnd type="none" w="med" len="med"/>
-                    </a:lnT>
-                    <a:lnB w="720" cap="flat" cmpd="sng" algn="ctr">
-                      <a:solidFill>
-                        <a:srgbClr val="FFFFFF"/>
-                      </a:solidFill>
-                      <a:prstDash val="solid"/>
-                      <a:round/>
-                      <a:headEnd type="none" w="med" len="med"/>
-                      <a:tailEnd type="none" w="med" len="med"/>
-                    </a:lnB>
-                    <a:lnTlToBr>
-                      <a:noFill/>
-                    </a:lnTlToBr>
-                    <a:lnBlToTr>
-                      <a:noFill/>
-                    </a:lnBlToTr>
-                    <a:solidFill>
-                      <a:srgbClr val="E8E9F1"/>
-                    </a:solidFill>
-                  </a:tcPr>
+                  <a:tcPr marL="53410" marR="53410" marT="29476" marB="27126" horzOverflow="overflow"/>
                 </a:tc>
                 <a:tc>
                   <a:txBody>
@@ -5186,63 +5091,31 @@
                         </a:tabLst>
                       </a:pPr>
                       <a:r>
-                        <a:rPr kumimoji="0" lang="pt-BR" altLang="pt-BR" sz="1100" b="0" i="1" u="none" strike="noStrike" cap="none" normalizeH="0" baseline="0">
+                        <a:rPr kumimoji="0" lang="pt-BR" altLang="pt-BR" sz="1100" u="none" strike="noStrike" cap="none" normalizeH="0" baseline="0">
                           <a:ln>
                             <a:noFill/>
                           </a:ln>
-                          <a:solidFill>
-                            <a:srgbClr val="2469A6"/>
-                          </a:solidFill>
                           <a:effectLst/>
                           <a:latin typeface="Arial" panose="020B0604020202020204" pitchFamily="34" charset="0"/>
-                          <a:ea typeface="MS PGothic" panose="020B0600070205080204" pitchFamily="34" charset="-128"/>
                           <a:cs typeface="Arial" panose="020B0604020202020204" pitchFamily="34" charset="0"/>
                         </a:rPr>
                         <a:t>Resultado Esperado</a:t>
                       </a:r>
+                      <a:endParaRPr kumimoji="0" lang="pt-BR" altLang="pt-BR" sz="1100" b="0" i="1" u="none" strike="noStrike" cap="none" normalizeH="0" baseline="0">
+                        <a:ln>
+                          <a:noFill/>
+                        </a:ln>
+                        <a:solidFill>
+                          <a:srgbClr val="2469A6"/>
+                        </a:solidFill>
+                        <a:effectLst/>
+                        <a:latin typeface="Arial" panose="020B0604020202020204" pitchFamily="34" charset="0"/>
+                        <a:ea typeface="MS PGothic" panose="020B0600070205080204" pitchFamily="34" charset="-128"/>
+                        <a:cs typeface="Arial" panose="020B0604020202020204" pitchFamily="34" charset="0"/>
+                      </a:endParaRPr>
                     </a:p>
                   </a:txBody>
-                  <a:tcPr marL="53410" marR="53410" marT="29476" marB="27126" horzOverflow="overflow">
-                    <a:lnL w="720" cap="flat" cmpd="sng" algn="ctr">
-                      <a:solidFill>
-                        <a:srgbClr val="FFFFFF"/>
-                      </a:solidFill>
-                      <a:prstDash val="solid"/>
-                      <a:round/>
-                      <a:headEnd type="none" w="med" len="med"/>
-                      <a:tailEnd type="none" w="med" len="med"/>
-                    </a:lnL>
-                    <a:lnR w="720" cap="flat" cmpd="sng" algn="ctr">
-                      <a:solidFill>
-                        <a:srgbClr val="FFFFFF"/>
-                      </a:solidFill>
-                      <a:prstDash val="solid"/>
-                      <a:round/>
-                      <a:headEnd type="none" w="med" len="med"/>
-                      <a:tailEnd type="none" w="med" len="med"/>
-                    </a:lnR>
-                    <a:lnT>
-                      <a:noFill/>
-                    </a:lnT>
-                    <a:lnB w="720" cap="flat" cmpd="sng" algn="ctr">
-                      <a:solidFill>
-                        <a:srgbClr val="FFFFFF"/>
-                      </a:solidFill>
-                      <a:prstDash val="solid"/>
-                      <a:round/>
-                      <a:headEnd type="none" w="med" len="med"/>
-                      <a:tailEnd type="none" w="med" len="med"/>
-                    </a:lnB>
-                    <a:lnTlToBr>
-                      <a:noFill/>
-                    </a:lnTlToBr>
-                    <a:lnBlToTr>
-                      <a:noFill/>
-                    </a:lnBlToTr>
-                    <a:solidFill>
-                      <a:srgbClr val="E8E9F1"/>
-                    </a:solidFill>
-                  </a:tcPr>
+                  <a:tcPr marL="53410" marR="53410" marT="29476" marB="27126" horzOverflow="overflow"/>
                 </a:tc>
                 <a:extLst>
                   <a:ext uri="{0D108BD9-81ED-4DB2-BD59-A6C34878D82A}">
@@ -5604,9 +5477,9 @@
                       </a:lvl9pPr>
                     </a:lstStyle>
                     <a:p>
-                      <a:pPr marL="0" marR="0" lvl="0" indent="0" algn="just" defTabSz="449263" rtl="0" eaLnBrk="1" fontAlgn="base" latinLnBrk="0" hangingPunct="0">
+                      <a:pPr marL="0" marR="0" lvl="0" indent="0" algn="l" defTabSz="449263" rtl="0" eaLnBrk="1" fontAlgn="base" latinLnBrk="0" hangingPunct="1">
                         <a:lnSpc>
-                          <a:spcPct val="86000"/>
+                          <a:spcPct val="100000"/>
                         </a:lnSpc>
                         <a:spcBef>
                           <a:spcPct val="0"/>
@@ -5643,99 +5516,31 @@
                         </a:tabLst>
                       </a:pPr>
                       <a:r>
-                        <a:rPr kumimoji="0" lang="pt-BR" altLang="pt-BR" sz="1100" b="0" i="0" u="none" strike="noStrike" cap="none" normalizeH="0" baseline="0" dirty="0">
+                        <a:rPr kumimoji="0" lang="pt-BR" altLang="pt-BR" sz="1100" u="none" strike="noStrike" cap="none" normalizeH="0" baseline="0" dirty="0">
                           <a:ln>
                             <a:noFill/>
                           </a:ln>
-                          <a:solidFill>
-                            <a:srgbClr val="000000"/>
-                          </a:solidFill>
                           <a:effectLst/>
                           <a:latin typeface="Arial" panose="020B0604020202020204" pitchFamily="34" charset="0"/>
-                          <a:ea typeface="MS PGothic" panose="020B0600070205080204" pitchFamily="34" charset="-128"/>
                           <a:cs typeface="Arial" panose="020B0604020202020204" pitchFamily="34" charset="0"/>
                         </a:rPr>
-                        <a:t>1. Dois(2) </a:t>
+                        <a:t>1. Em lançamentos, escolher a opção “editar”.</a:t>
                       </a:r>
-                      <a:r>
-                        <a:rPr kumimoji="0" lang="pt-BR" altLang="pt-BR" sz="1100" b="0" i="0" u="none" strike="noStrike" cap="none" normalizeH="0" baseline="0" dirty="0" err="1">
-                          <a:ln>
-                            <a:noFill/>
-                          </a:ln>
-                          <a:solidFill>
-                            <a:srgbClr val="000000"/>
-                          </a:solidFill>
-                          <a:effectLst/>
-                          <a:latin typeface="Arial" panose="020B0604020202020204" pitchFamily="34" charset="0"/>
-                          <a:ea typeface="MS PGothic" panose="020B0600070205080204" pitchFamily="34" charset="-128"/>
-                          <a:cs typeface="Arial" panose="020B0604020202020204" pitchFamily="34" charset="0"/>
-                        </a:rPr>
-                        <a:t>click’s</a:t>
-                      </a:r>
-                      <a:r>
-                        <a:rPr kumimoji="0" lang="pt-BR" altLang="pt-BR" sz="1100" b="0" i="0" u="none" strike="noStrike" cap="none" normalizeH="0" baseline="0" dirty="0">
-                          <a:ln>
-                            <a:noFill/>
-                          </a:ln>
-                          <a:solidFill>
-                            <a:srgbClr val="000000"/>
-                          </a:solidFill>
-                          <a:effectLst/>
-                          <a:latin typeface="Arial" panose="020B0604020202020204" pitchFamily="34" charset="0"/>
-                          <a:ea typeface="MS PGothic" panose="020B0600070205080204" pitchFamily="34" charset="-128"/>
-                          <a:cs typeface="Arial" panose="020B0604020202020204" pitchFamily="34" charset="0"/>
-                        </a:rPr>
-                        <a:t> sobre o lançamento na lista.</a:t>
-                      </a:r>
+                      <a:endParaRPr kumimoji="0" lang="pt-BR" altLang="pt-BR" sz="1100" b="0" i="0" u="none" strike="noStrike" cap="none" normalizeH="0" baseline="0" dirty="0">
+                        <a:ln>
+                          <a:noFill/>
+                        </a:ln>
+                        <a:solidFill>
+                          <a:srgbClr val="000000"/>
+                        </a:solidFill>
+                        <a:effectLst/>
+                        <a:latin typeface="Arial" panose="020B0604020202020204" pitchFamily="34" charset="0"/>
+                        <a:ea typeface="MS PGothic" panose="020B0600070205080204" pitchFamily="34" charset="-128"/>
+                        <a:cs typeface="Arial" panose="020B0604020202020204" pitchFamily="34" charset="0"/>
+                      </a:endParaRPr>
                     </a:p>
                   </a:txBody>
-                  <a:tcPr marL="53410" marR="53410" marT="29262" marB="27126" horzOverflow="overflow">
-                    <a:lnL w="720" cap="flat" cmpd="sng" algn="ctr">
-                      <a:solidFill>
-                        <a:srgbClr val="FFFFFF"/>
-                      </a:solidFill>
-                      <a:prstDash val="solid"/>
-                      <a:round/>
-                      <a:headEnd type="none" w="med" len="med"/>
-                      <a:tailEnd type="none" w="med" len="med"/>
-                    </a:lnL>
-                    <a:lnR w="720" cap="flat" cmpd="sng" algn="ctr">
-                      <a:solidFill>
-                        <a:srgbClr val="FFFFFF"/>
-                      </a:solidFill>
-                      <a:prstDash val="solid"/>
-                      <a:round/>
-                      <a:headEnd type="none" w="med" len="med"/>
-                      <a:tailEnd type="none" w="med" len="med"/>
-                    </a:lnR>
-                    <a:lnT w="720" cap="flat" cmpd="sng" algn="ctr">
-                      <a:solidFill>
-                        <a:srgbClr val="FFFFFF"/>
-                      </a:solidFill>
-                      <a:prstDash val="solid"/>
-                      <a:round/>
-                      <a:headEnd type="none" w="med" len="med"/>
-                      <a:tailEnd type="none" w="med" len="med"/>
-                    </a:lnT>
-                    <a:lnB w="720" cap="flat" cmpd="sng" algn="ctr">
-                      <a:solidFill>
-                        <a:srgbClr val="FFFFFF"/>
-                      </a:solidFill>
-                      <a:prstDash val="solid"/>
-                      <a:round/>
-                      <a:headEnd type="none" w="med" len="med"/>
-                      <a:tailEnd type="none" w="med" len="med"/>
-                    </a:lnB>
-                    <a:lnTlToBr>
-                      <a:noFill/>
-                    </a:lnTlToBr>
-                    <a:lnBlToTr>
-                      <a:noFill/>
-                    </a:lnBlToTr>
-                    <a:solidFill>
-                      <a:srgbClr val="CCD1E1"/>
-                    </a:solidFill>
-                  </a:tcPr>
+                  <a:tcPr marL="53410" marR="53410" marT="29262" marB="27126" horzOverflow="overflow"/>
                 </a:tc>
                 <a:tc>
                   <a:txBody>
@@ -6129,69 +5934,31 @@
                         </a:tabLst>
                       </a:pPr>
                       <a:r>
-                        <a:rPr kumimoji="0" lang="pt-BR" altLang="pt-BR" sz="1100" b="0" i="0" u="none" strike="noStrike" cap="none" normalizeH="0" baseline="0" dirty="0">
+                        <a:rPr kumimoji="0" lang="pt-BR" altLang="pt-BR" sz="1100" u="none" strike="noStrike" cap="none" normalizeH="0" baseline="0" dirty="0">
                           <a:ln>
                             <a:noFill/>
                           </a:ln>
-                          <a:solidFill>
-                            <a:srgbClr val="000000"/>
-                          </a:solidFill>
                           <a:effectLst/>
                           <a:latin typeface="Arial" panose="020B0604020202020204" pitchFamily="34" charset="0"/>
-                          <a:ea typeface="MS PGothic" panose="020B0600070205080204" pitchFamily="34" charset="-128"/>
                           <a:cs typeface="Arial" panose="020B0604020202020204" pitchFamily="34" charset="0"/>
                         </a:rPr>
-                        <a:t>Deve aparecer uma tela apresentando as informações do lançamento.</a:t>
+                        <a:t>Deve aparecer uma tela apresentando as informações do lançamento, incluindo a notificação.</a:t>
                       </a:r>
+                      <a:endParaRPr kumimoji="0" lang="pt-BR" altLang="pt-BR" sz="1100" b="0" i="0" u="none" strike="noStrike" cap="none" normalizeH="0" baseline="0" dirty="0">
+                        <a:ln>
+                          <a:noFill/>
+                        </a:ln>
+                        <a:solidFill>
+                          <a:srgbClr val="000000"/>
+                        </a:solidFill>
+                        <a:effectLst/>
+                        <a:latin typeface="Arial" panose="020B0604020202020204" pitchFamily="34" charset="0"/>
+                        <a:ea typeface="MS PGothic" panose="020B0600070205080204" pitchFamily="34" charset="-128"/>
+                        <a:cs typeface="Arial" panose="020B0604020202020204" pitchFamily="34" charset="0"/>
+                      </a:endParaRPr>
                     </a:p>
                   </a:txBody>
-                  <a:tcPr marL="53410" marR="53410" marT="29262" marB="27126" horzOverflow="overflow">
-                    <a:lnL w="720" cap="flat" cmpd="sng" algn="ctr">
-                      <a:solidFill>
-                        <a:srgbClr val="FFFFFF"/>
-                      </a:solidFill>
-                      <a:prstDash val="solid"/>
-                      <a:round/>
-                      <a:headEnd type="none" w="med" len="med"/>
-                      <a:tailEnd type="none" w="med" len="med"/>
-                    </a:lnL>
-                    <a:lnR w="720" cap="flat" cmpd="sng" algn="ctr">
-                      <a:solidFill>
-                        <a:srgbClr val="FFFFFF"/>
-                      </a:solidFill>
-                      <a:prstDash val="solid"/>
-                      <a:round/>
-                      <a:headEnd type="none" w="med" len="med"/>
-                      <a:tailEnd type="none" w="med" len="med"/>
-                    </a:lnR>
-                    <a:lnT w="720" cap="flat" cmpd="sng" algn="ctr">
-                      <a:solidFill>
-                        <a:srgbClr val="FFFFFF"/>
-                      </a:solidFill>
-                      <a:prstDash val="solid"/>
-                      <a:round/>
-                      <a:headEnd type="none" w="med" len="med"/>
-                      <a:tailEnd type="none" w="med" len="med"/>
-                    </a:lnT>
-                    <a:lnB w="720" cap="flat" cmpd="sng" algn="ctr">
-                      <a:solidFill>
-                        <a:srgbClr val="FFFFFF"/>
-                      </a:solidFill>
-                      <a:prstDash val="solid"/>
-                      <a:round/>
-                      <a:headEnd type="none" w="med" len="med"/>
-                      <a:tailEnd type="none" w="med" len="med"/>
-                    </a:lnB>
-                    <a:lnTlToBr>
-                      <a:noFill/>
-                    </a:lnTlToBr>
-                    <a:lnBlToTr>
-                      <a:noFill/>
-                    </a:lnBlToTr>
-                    <a:solidFill>
-                      <a:srgbClr val="CCD1E1"/>
-                    </a:solidFill>
-                  </a:tcPr>
+                  <a:tcPr marL="53410" marR="53410" marT="29262" marB="27126" horzOverflow="overflow"/>
                 </a:tc>
                 <a:extLst>
                   <a:ext uri="{0D108BD9-81ED-4DB2-BD59-A6C34878D82A}">
@@ -6592,69 +6359,31 @@
                         </a:tabLst>
                       </a:pPr>
                       <a:r>
-                        <a:rPr kumimoji="0" lang="pt-BR" altLang="pt-BR" sz="1100" b="0" i="0" u="none" strike="noStrike" cap="none" normalizeH="0" baseline="0" dirty="0">
+                        <a:rPr kumimoji="0" lang="pt-BR" altLang="pt-BR" sz="1100" u="none" strike="noStrike" cap="none" normalizeH="0" baseline="0" dirty="0">
                           <a:ln>
                             <a:noFill/>
                           </a:ln>
-                          <a:solidFill>
-                            <a:srgbClr val="000000"/>
-                          </a:solidFill>
                           <a:effectLst/>
                           <a:latin typeface="Arial" panose="020B0604020202020204" pitchFamily="34" charset="0"/>
-                          <a:ea typeface="MS PGothic" panose="020B0600070205080204" pitchFamily="34" charset="-128"/>
                           <a:cs typeface="Arial" panose="020B0604020202020204" pitchFamily="34" charset="0"/>
                         </a:rPr>
-                        <a:t>2. Informar o valor , o tipo de lançamento recorrente, descrição, selecionar a categoria, selecionar a opção alerta e não informar  quanto tempo antes deve ser alertado  e finalizar o procedimento escolhendo “Salvar”.</a:t>
+                        <a:t>2. Não informa os campos solicitados para a notificação e finalizar o procedimento escolhendo “Salvar”.</a:t>
                       </a:r>
+                      <a:endParaRPr kumimoji="0" lang="pt-BR" altLang="pt-BR" sz="1100" b="0" i="0" u="none" strike="noStrike" cap="none" normalizeH="0" baseline="0" dirty="0">
+                        <a:ln>
+                          <a:noFill/>
+                        </a:ln>
+                        <a:solidFill>
+                          <a:srgbClr val="000000"/>
+                        </a:solidFill>
+                        <a:effectLst/>
+                        <a:latin typeface="Arial" panose="020B0604020202020204" pitchFamily="34" charset="0"/>
+                        <a:ea typeface="MS PGothic" panose="020B0600070205080204" pitchFamily="34" charset="-128"/>
+                        <a:cs typeface="Arial" panose="020B0604020202020204" pitchFamily="34" charset="0"/>
+                      </a:endParaRPr>
                     </a:p>
                   </a:txBody>
-                  <a:tcPr marL="53410" marR="53410" marT="29262" marB="27126" horzOverflow="overflow">
-                    <a:lnL w="720" cap="flat" cmpd="sng" algn="ctr">
-                      <a:solidFill>
-                        <a:srgbClr val="FFFFFF"/>
-                      </a:solidFill>
-                      <a:prstDash val="solid"/>
-                      <a:round/>
-                      <a:headEnd type="none" w="med" len="med"/>
-                      <a:tailEnd type="none" w="med" len="med"/>
-                    </a:lnL>
-                    <a:lnR w="720" cap="flat" cmpd="sng" algn="ctr">
-                      <a:solidFill>
-                        <a:srgbClr val="FFFFFF"/>
-                      </a:solidFill>
-                      <a:prstDash val="solid"/>
-                      <a:round/>
-                      <a:headEnd type="none" w="med" len="med"/>
-                      <a:tailEnd type="none" w="med" len="med"/>
-                    </a:lnR>
-                    <a:lnT w="720" cap="flat" cmpd="sng" algn="ctr">
-                      <a:solidFill>
-                        <a:srgbClr val="FFFFFF"/>
-                      </a:solidFill>
-                      <a:prstDash val="solid"/>
-                      <a:round/>
-                      <a:headEnd type="none" w="med" len="med"/>
-                      <a:tailEnd type="none" w="med" len="med"/>
-                    </a:lnT>
-                    <a:lnB w="720" cap="flat" cmpd="sng" algn="ctr">
-                      <a:solidFill>
-                        <a:srgbClr val="FFFFFF"/>
-                      </a:solidFill>
-                      <a:prstDash val="solid"/>
-                      <a:round/>
-                      <a:headEnd type="none" w="med" len="med"/>
-                      <a:tailEnd type="none" w="med" len="med"/>
-                    </a:lnB>
-                    <a:lnTlToBr>
-                      <a:noFill/>
-                    </a:lnTlToBr>
-                    <a:lnBlToTr>
-                      <a:noFill/>
-                    </a:lnBlToTr>
-                    <a:solidFill>
-                      <a:srgbClr val="E8E9F1"/>
-                    </a:solidFill>
-                  </a:tcPr>
+                  <a:tcPr marL="53410" marR="53410" marT="29262" marB="27126" horzOverflow="overflow"/>
                 </a:tc>
                 <a:tc>
                   <a:txBody>
@@ -7048,69 +6777,31 @@
                         </a:tabLst>
                       </a:pPr>
                       <a:r>
-                        <a:rPr kumimoji="0" lang="pt-BR" altLang="pt-BR" sz="1100" b="0" i="0" u="none" strike="noStrike" cap="none" normalizeH="0" baseline="0" dirty="0">
+                        <a:rPr kumimoji="0" lang="pt-BR" altLang="pt-BR" sz="1100" u="none" strike="noStrike" cap="none" normalizeH="0" baseline="0" dirty="0">
                           <a:ln>
                             <a:noFill/>
                           </a:ln>
-                          <a:solidFill>
-                            <a:srgbClr val="000000"/>
-                          </a:solidFill>
                           <a:effectLst/>
                           <a:latin typeface="Arial" panose="020B0604020202020204" pitchFamily="34" charset="0"/>
-                          <a:ea typeface="MS PGothic" panose="020B0600070205080204" pitchFamily="34" charset="-128"/>
                           <a:cs typeface="Arial" panose="020B0604020202020204" pitchFamily="34" charset="0"/>
                         </a:rPr>
-                        <a:t>Aparece uma tela com a seguinte mensagem: “Faltou informar quantidade de ‘Tempo’. Informe o ‘Tempo’ ”.</a:t>
+                        <a:t>Aparece uma tela com a seguinte mensagem: “Faltou informar o tempo da notificação”.</a:t>
                       </a:r>
+                      <a:endParaRPr kumimoji="0" lang="pt-BR" altLang="pt-BR" sz="1100" b="0" i="0" u="none" strike="noStrike" cap="none" normalizeH="0" baseline="0" dirty="0">
+                        <a:ln>
+                          <a:noFill/>
+                        </a:ln>
+                        <a:solidFill>
+                          <a:srgbClr val="000000"/>
+                        </a:solidFill>
+                        <a:effectLst/>
+                        <a:latin typeface="Arial" panose="020B0604020202020204" pitchFamily="34" charset="0"/>
+                        <a:ea typeface="MS PGothic" panose="020B0600070205080204" pitchFamily="34" charset="-128"/>
+                        <a:cs typeface="Arial" panose="020B0604020202020204" pitchFamily="34" charset="0"/>
+                      </a:endParaRPr>
                     </a:p>
                   </a:txBody>
-                  <a:tcPr marL="53410" marR="53410" marT="29262" marB="27126" horzOverflow="overflow">
-                    <a:lnL w="720" cap="flat" cmpd="sng" algn="ctr">
-                      <a:solidFill>
-                        <a:srgbClr val="FFFFFF"/>
-                      </a:solidFill>
-                      <a:prstDash val="solid"/>
-                      <a:round/>
-                      <a:headEnd type="none" w="med" len="med"/>
-                      <a:tailEnd type="none" w="med" len="med"/>
-                    </a:lnL>
-                    <a:lnR w="720" cap="flat" cmpd="sng" algn="ctr">
-                      <a:solidFill>
-                        <a:srgbClr val="FFFFFF"/>
-                      </a:solidFill>
-                      <a:prstDash val="solid"/>
-                      <a:round/>
-                      <a:headEnd type="none" w="med" len="med"/>
-                      <a:tailEnd type="none" w="med" len="med"/>
-                    </a:lnR>
-                    <a:lnT w="720" cap="flat" cmpd="sng" algn="ctr">
-                      <a:solidFill>
-                        <a:srgbClr val="FFFFFF"/>
-                      </a:solidFill>
-                      <a:prstDash val="solid"/>
-                      <a:round/>
-                      <a:headEnd type="none" w="med" len="med"/>
-                      <a:tailEnd type="none" w="med" len="med"/>
-                    </a:lnT>
-                    <a:lnB w="720" cap="flat" cmpd="sng" algn="ctr">
-                      <a:solidFill>
-                        <a:srgbClr val="FFFFFF"/>
-                      </a:solidFill>
-                      <a:prstDash val="solid"/>
-                      <a:round/>
-                      <a:headEnd type="none" w="med" len="med"/>
-                      <a:tailEnd type="none" w="med" len="med"/>
-                    </a:lnB>
-                    <a:lnTlToBr>
-                      <a:noFill/>
-                    </a:lnTlToBr>
-                    <a:lnBlToTr>
-                      <a:noFill/>
-                    </a:lnBlToTr>
-                    <a:solidFill>
-                      <a:srgbClr val="E8E9F1"/>
-                    </a:solidFill>
-                  </a:tcPr>
+                  <a:tcPr marL="53410" marR="53410" marT="29262" marB="27126" horzOverflow="overflow"/>
                 </a:tc>
                 <a:extLst>
                   <a:ext uri="{0D108BD9-81ED-4DB2-BD59-A6C34878D82A}">
@@ -7184,10 +6875,10 @@
       </p:sp>
       <p:graphicFrame>
         <p:nvGraphicFramePr>
-          <p:cNvPr id="4" name="Group 2">
+          <p:cNvPr id="5" name="Group 2">
             <a:extLst>
               <a:ext uri="{FF2B5EF4-FFF2-40B4-BE49-F238E27FC236}">
-                <a16:creationId xmlns:a16="http://schemas.microsoft.com/office/drawing/2014/main" id="{C0C16EF5-C16B-45A7-A0C0-D152C4D0FDDF}"/>
+                <a16:creationId xmlns:a16="http://schemas.microsoft.com/office/drawing/2014/main" id="{092A552A-DD56-4065-914F-4972CC229C62}"/>
               </a:ext>
             </a:extLst>
           </p:cNvPr>
@@ -7197,7 +6888,7 @@
           <p:nvPr>
             <p:extLst>
               <p:ext uri="{D42A27DB-BD31-4B8C-83A1-F6EECF244321}">
-                <p14:modId xmlns:p14="http://schemas.microsoft.com/office/powerpoint/2010/main" val="4065343915"/>
+                <p14:modId xmlns:p14="http://schemas.microsoft.com/office/powerpoint/2010/main" val="1415680604"/>
               </p:ext>
             </p:extLst>
           </p:nvPr>
@@ -7209,7 +6900,9 @@
         <a:graphic>
           <a:graphicData uri="http://schemas.openxmlformats.org/drawingml/2006/table">
             <a:tbl>
-              <a:tblPr/>
+              <a:tblPr>
+                <a:tableStyleId>{69CF1AB2-1976-4502-BF36-3FF5EA218861}</a:tableStyleId>
+              </a:tblPr>
               <a:tblGrid>
                 <a:gridCol w="2610155">
                   <a:extLst>
@@ -7624,7 +7317,7 @@
                             <a:noFill/>
                           </a:ln>
                           <a:solidFill>
-                            <a:srgbClr val="FFFFFF"/>
+                            <a:schemeClr val="tx1"/>
                           </a:solidFill>
                           <a:effectLst/>
                           <a:latin typeface="Arial" panose="020B0604020202020204" pitchFamily="34" charset="0"/>
@@ -7635,47 +7328,7 @@
                       </a:r>
                     </a:p>
                   </a:txBody>
-                  <a:tcPr marL="53410" marR="53410" marT="29903" marB="27126" horzOverflow="overflow">
-                    <a:lnL w="720" cap="flat" cmpd="sng" algn="ctr">
-                      <a:solidFill>
-                        <a:srgbClr val="FFFFFF"/>
-                      </a:solidFill>
-                      <a:prstDash val="solid"/>
-                      <a:round/>
-                      <a:headEnd type="none" w="med" len="med"/>
-                      <a:tailEnd type="none" w="med" len="med"/>
-                    </a:lnL>
-                    <a:lnR>
-                      <a:noFill/>
-                    </a:lnR>
-                    <a:lnT w="720" cap="flat" cmpd="sng" algn="ctr">
-                      <a:solidFill>
-                        <a:srgbClr val="FFFFFF"/>
-                      </a:solidFill>
-                      <a:prstDash val="solid"/>
-                      <a:round/>
-                      <a:headEnd type="none" w="med" len="med"/>
-                      <a:tailEnd type="none" w="med" len="med"/>
-                    </a:lnT>
-                    <a:lnB w="720" cap="flat" cmpd="sng" algn="ctr">
-                      <a:solidFill>
-                        <a:srgbClr val="FFFFFF"/>
-                      </a:solidFill>
-                      <a:prstDash val="solid"/>
-                      <a:round/>
-                      <a:headEnd type="none" w="med" len="med"/>
-                      <a:tailEnd type="none" w="med" len="med"/>
-                    </a:lnB>
-                    <a:lnTlToBr>
-                      <a:noFill/>
-                    </a:lnTlToBr>
-                    <a:lnBlToTr>
-                      <a:noFill/>
-                    </a:lnBlToTr>
-                    <a:solidFill>
-                      <a:srgbClr val="80B5E2"/>
-                    </a:solidFill>
-                  </a:tcPr>
+                  <a:tcPr marL="53410" marR="53410" marT="29903" marB="27126" horzOverflow="overflow"/>
                 </a:tc>
                 <a:tc hMerge="1">
                   <a:txBody>
@@ -8086,63 +7739,34 @@
                         </a:tabLst>
                       </a:pPr>
                       <a:r>
-                        <a:rPr kumimoji="0" lang="pt-BR" altLang="pt-BR" sz="1100" b="0" i="0" u="none" strike="noStrike" cap="none" normalizeH="0" baseline="0" dirty="0">
+                        <a:rPr kumimoji="0" lang="pt-BR" altLang="pt-BR" sz="1100" u="none" strike="noStrike" cap="none" normalizeH="0" baseline="0" dirty="0">
                           <a:ln>
                             <a:noFill/>
                           </a:ln>
                           <a:solidFill>
-                            <a:srgbClr val="000000"/>
+                            <a:schemeClr val="tx1"/>
                           </a:solidFill>
                           <a:effectLst/>
                           <a:latin typeface="Arial" panose="020B0604020202020204" pitchFamily="34" charset="0"/>
-                          <a:ea typeface="MS PGothic" panose="020B0600070205080204" pitchFamily="34" charset="-128"/>
                           <a:cs typeface="Arial" panose="020B0604020202020204" pitchFamily="34" charset="0"/>
                         </a:rPr>
                         <a:t>Pré-condição: O usuário deve estar autenticado no sistema.</a:t>
                       </a:r>
+                      <a:endParaRPr kumimoji="0" lang="pt-BR" altLang="pt-BR" sz="1100" b="0" i="0" u="none" strike="noStrike" cap="none" normalizeH="0" baseline="0" dirty="0">
+                        <a:ln>
+                          <a:noFill/>
+                        </a:ln>
+                        <a:solidFill>
+                          <a:schemeClr val="tx1"/>
+                        </a:solidFill>
+                        <a:effectLst/>
+                        <a:latin typeface="Arial" panose="020B0604020202020204" pitchFamily="34" charset="0"/>
+                        <a:ea typeface="MS PGothic" panose="020B0600070205080204" pitchFamily="34" charset="-128"/>
+                        <a:cs typeface="Arial" panose="020B0604020202020204" pitchFamily="34" charset="0"/>
+                      </a:endParaRPr>
                     </a:p>
                   </a:txBody>
-                  <a:tcPr marL="53410" marR="53410" marT="29903" marB="27126" horzOverflow="overflow">
-                    <a:lnL w="720" cap="flat" cmpd="sng" algn="ctr">
-                      <a:solidFill>
-                        <a:srgbClr val="FFFFFF"/>
-                      </a:solidFill>
-                      <a:prstDash val="solid"/>
-                      <a:round/>
-                      <a:headEnd type="none" w="med" len="med"/>
-                      <a:tailEnd type="none" w="med" len="med"/>
-                    </a:lnL>
-                    <a:lnR>
-                      <a:noFill/>
-                    </a:lnR>
-                    <a:lnT w="720" cap="flat" cmpd="sng" algn="ctr">
-                      <a:solidFill>
-                        <a:srgbClr val="FFFFFF"/>
-                      </a:solidFill>
-                      <a:prstDash val="solid"/>
-                      <a:round/>
-                      <a:headEnd type="none" w="med" len="med"/>
-                      <a:tailEnd type="none" w="med" len="med"/>
-                    </a:lnT>
-                    <a:lnB w="720" cap="flat" cmpd="sng" algn="ctr">
-                      <a:solidFill>
-                        <a:srgbClr val="FFFFFF"/>
-                      </a:solidFill>
-                      <a:prstDash val="solid"/>
-                      <a:round/>
-                      <a:headEnd type="none" w="med" len="med"/>
-                      <a:tailEnd type="none" w="med" len="med"/>
-                    </a:lnB>
-                    <a:lnTlToBr>
-                      <a:noFill/>
-                    </a:lnTlToBr>
-                    <a:lnBlToTr>
-                      <a:noFill/>
-                    </a:lnBlToTr>
-                    <a:solidFill>
-                      <a:srgbClr val="CCD1E1"/>
-                    </a:solidFill>
-                  </a:tcPr>
+                  <a:tcPr marL="53410" marR="53410" marT="29903" marB="27126" horzOverflow="overflow"/>
                 </a:tc>
                 <a:tc hMerge="1">
                   <a:txBody>
@@ -8553,69 +8177,34 @@
                         </a:tabLst>
                       </a:pPr>
                       <a:r>
-                        <a:rPr kumimoji="0" lang="pt-BR" altLang="pt-BR" sz="1100" b="0" i="1" u="none" strike="noStrike" cap="none" normalizeH="0" baseline="0" dirty="0">
+                        <a:rPr kumimoji="0" lang="pt-BR" altLang="pt-BR" sz="1100" u="none" strike="noStrike" cap="none" normalizeH="0" baseline="0">
                           <a:ln>
                             <a:noFill/>
                           </a:ln>
                           <a:solidFill>
-                            <a:srgbClr val="2469A6"/>
+                            <a:schemeClr val="tx1"/>
                           </a:solidFill>
                           <a:effectLst/>
                           <a:latin typeface="Arial" panose="020B0604020202020204" pitchFamily="34" charset="0"/>
-                          <a:ea typeface="MS PGothic" panose="020B0600070205080204" pitchFamily="34" charset="-128"/>
                           <a:cs typeface="Arial" panose="020B0604020202020204" pitchFamily="34" charset="0"/>
                         </a:rPr>
                         <a:t>Procedimentos</a:t>
                       </a:r>
+                      <a:endParaRPr kumimoji="0" lang="pt-BR" altLang="pt-BR" sz="1100" b="0" i="1" u="none" strike="noStrike" cap="none" normalizeH="0" baseline="0">
+                        <a:ln>
+                          <a:noFill/>
+                        </a:ln>
+                        <a:solidFill>
+                          <a:schemeClr val="tx1"/>
+                        </a:solidFill>
+                        <a:effectLst/>
+                        <a:latin typeface="Arial" panose="020B0604020202020204" pitchFamily="34" charset="0"/>
+                        <a:ea typeface="MS PGothic" panose="020B0600070205080204" pitchFamily="34" charset="-128"/>
+                        <a:cs typeface="Arial" panose="020B0604020202020204" pitchFamily="34" charset="0"/>
+                      </a:endParaRPr>
                     </a:p>
                   </a:txBody>
-                  <a:tcPr marL="53410" marR="53410" marT="29476" marB="27126" horzOverflow="overflow">
-                    <a:lnL w="720" cap="flat" cmpd="sng" algn="ctr">
-                      <a:solidFill>
-                        <a:srgbClr val="FFFFFF"/>
-                      </a:solidFill>
-                      <a:prstDash val="solid"/>
-                      <a:round/>
-                      <a:headEnd type="none" w="med" len="med"/>
-                      <a:tailEnd type="none" w="med" len="med"/>
-                    </a:lnL>
-                    <a:lnR w="720" cap="flat" cmpd="sng" algn="ctr">
-                      <a:solidFill>
-                        <a:srgbClr val="FFFFFF"/>
-                      </a:solidFill>
-                      <a:prstDash val="solid"/>
-                      <a:round/>
-                      <a:headEnd type="none" w="med" len="med"/>
-                      <a:tailEnd type="none" w="med" len="med"/>
-                    </a:lnR>
-                    <a:lnT w="720" cap="flat" cmpd="sng" algn="ctr">
-                      <a:solidFill>
-                        <a:srgbClr val="FFFFFF"/>
-                      </a:solidFill>
-                      <a:prstDash val="solid"/>
-                      <a:round/>
-                      <a:headEnd type="none" w="med" len="med"/>
-                      <a:tailEnd type="none" w="med" len="med"/>
-                    </a:lnT>
-                    <a:lnB w="720" cap="flat" cmpd="sng" algn="ctr">
-                      <a:solidFill>
-                        <a:srgbClr val="FFFFFF"/>
-                      </a:solidFill>
-                      <a:prstDash val="solid"/>
-                      <a:round/>
-                      <a:headEnd type="none" w="med" len="med"/>
-                      <a:tailEnd type="none" w="med" len="med"/>
-                    </a:lnB>
-                    <a:lnTlToBr>
-                      <a:noFill/>
-                    </a:lnTlToBr>
-                    <a:lnBlToTr>
-                      <a:noFill/>
-                    </a:lnBlToTr>
-                    <a:solidFill>
-                      <a:srgbClr val="E8E9F1"/>
-                    </a:solidFill>
-                  </a:tcPr>
+                  <a:tcPr marL="53410" marR="53410" marT="29476" marB="27126" horzOverflow="overflow"/>
                 </a:tc>
                 <a:tc>
                   <a:txBody>
@@ -9009,63 +8598,34 @@
                         </a:tabLst>
                       </a:pPr>
                       <a:r>
-                        <a:rPr kumimoji="0" lang="pt-BR" altLang="pt-BR" sz="1100" b="0" i="1" u="none" strike="noStrike" cap="none" normalizeH="0" baseline="0">
+                        <a:rPr kumimoji="0" lang="pt-BR" altLang="pt-BR" sz="1100" u="none" strike="noStrike" cap="none" normalizeH="0" baseline="0">
                           <a:ln>
                             <a:noFill/>
                           </a:ln>
                           <a:solidFill>
-                            <a:srgbClr val="2469A6"/>
+                            <a:schemeClr val="tx1"/>
                           </a:solidFill>
                           <a:effectLst/>
                           <a:latin typeface="Arial" panose="020B0604020202020204" pitchFamily="34" charset="0"/>
-                          <a:ea typeface="MS PGothic" panose="020B0600070205080204" pitchFamily="34" charset="-128"/>
                           <a:cs typeface="Arial" panose="020B0604020202020204" pitchFamily="34" charset="0"/>
                         </a:rPr>
                         <a:t>Resultado Esperado</a:t>
                       </a:r>
+                      <a:endParaRPr kumimoji="0" lang="pt-BR" altLang="pt-BR" sz="1100" b="0" i="1" u="none" strike="noStrike" cap="none" normalizeH="0" baseline="0">
+                        <a:ln>
+                          <a:noFill/>
+                        </a:ln>
+                        <a:solidFill>
+                          <a:schemeClr val="tx1"/>
+                        </a:solidFill>
+                        <a:effectLst/>
+                        <a:latin typeface="Arial" panose="020B0604020202020204" pitchFamily="34" charset="0"/>
+                        <a:ea typeface="MS PGothic" panose="020B0600070205080204" pitchFamily="34" charset="-128"/>
+                        <a:cs typeface="Arial" panose="020B0604020202020204" pitchFamily="34" charset="0"/>
+                      </a:endParaRPr>
                     </a:p>
                   </a:txBody>
-                  <a:tcPr marL="53410" marR="53410" marT="29476" marB="27126" horzOverflow="overflow">
-                    <a:lnL w="720" cap="flat" cmpd="sng" algn="ctr">
-                      <a:solidFill>
-                        <a:srgbClr val="FFFFFF"/>
-                      </a:solidFill>
-                      <a:prstDash val="solid"/>
-                      <a:round/>
-                      <a:headEnd type="none" w="med" len="med"/>
-                      <a:tailEnd type="none" w="med" len="med"/>
-                    </a:lnL>
-                    <a:lnR w="720" cap="flat" cmpd="sng" algn="ctr">
-                      <a:solidFill>
-                        <a:srgbClr val="FFFFFF"/>
-                      </a:solidFill>
-                      <a:prstDash val="solid"/>
-                      <a:round/>
-                      <a:headEnd type="none" w="med" len="med"/>
-                      <a:tailEnd type="none" w="med" len="med"/>
-                    </a:lnR>
-                    <a:lnT>
-                      <a:noFill/>
-                    </a:lnT>
-                    <a:lnB w="720" cap="flat" cmpd="sng" algn="ctr">
-                      <a:solidFill>
-                        <a:srgbClr val="FFFFFF"/>
-                      </a:solidFill>
-                      <a:prstDash val="solid"/>
-                      <a:round/>
-                      <a:headEnd type="none" w="med" len="med"/>
-                      <a:tailEnd type="none" w="med" len="med"/>
-                    </a:lnB>
-                    <a:lnTlToBr>
-                      <a:noFill/>
-                    </a:lnTlToBr>
-                    <a:lnBlToTr>
-                      <a:noFill/>
-                    </a:lnBlToTr>
-                    <a:solidFill>
-                      <a:srgbClr val="E8E9F1"/>
-                    </a:solidFill>
-                  </a:tcPr>
+                  <a:tcPr marL="53410" marR="53410" marT="29476" marB="27126" horzOverflow="overflow"/>
                 </a:tc>
                 <a:extLst>
                   <a:ext uri="{0D108BD9-81ED-4DB2-BD59-A6C34878D82A}">
@@ -9427,9 +8987,9 @@
                       </a:lvl9pPr>
                     </a:lstStyle>
                     <a:p>
-                      <a:pPr marL="0" marR="0" lvl="0" indent="0" algn="just" defTabSz="449263" rtl="0" eaLnBrk="1" fontAlgn="base" latinLnBrk="0" hangingPunct="0">
+                      <a:pPr marL="0" marR="0" lvl="0" indent="0" algn="l" defTabSz="449263" rtl="0" eaLnBrk="1" fontAlgn="base" latinLnBrk="0" hangingPunct="1">
                         <a:lnSpc>
-                          <a:spcPct val="86000"/>
+                          <a:spcPct val="100000"/>
                         </a:lnSpc>
                         <a:spcBef>
                           <a:spcPct val="0"/>
@@ -9466,99 +9026,34 @@
                         </a:tabLst>
                       </a:pPr>
                       <a:r>
-                        <a:rPr kumimoji="0" lang="pt-BR" altLang="pt-BR" sz="1100" b="0" i="0" u="none" strike="noStrike" cap="none" normalizeH="0" baseline="0" dirty="0">
+                        <a:rPr kumimoji="0" lang="pt-BR" altLang="pt-BR" sz="1100" u="none" strike="noStrike" cap="none" normalizeH="0" baseline="0" dirty="0">
                           <a:ln>
                             <a:noFill/>
                           </a:ln>
                           <a:solidFill>
-                            <a:srgbClr val="000000"/>
+                            <a:schemeClr val="tx1"/>
                           </a:solidFill>
                           <a:effectLst/>
                           <a:latin typeface="Arial" panose="020B0604020202020204" pitchFamily="34" charset="0"/>
-                          <a:ea typeface="MS PGothic" panose="020B0600070205080204" pitchFamily="34" charset="-128"/>
                           <a:cs typeface="Arial" panose="020B0604020202020204" pitchFamily="34" charset="0"/>
                         </a:rPr>
-                        <a:t>1. Dois(2) </a:t>
+                        <a:t>1. Em lançamentos, escolher a opção “editar”.</a:t>
                       </a:r>
-                      <a:r>
-                        <a:rPr kumimoji="0" lang="pt-BR" altLang="pt-BR" sz="1100" b="0" i="0" u="none" strike="noStrike" cap="none" normalizeH="0" baseline="0" dirty="0" err="1">
-                          <a:ln>
-                            <a:noFill/>
-                          </a:ln>
-                          <a:solidFill>
-                            <a:srgbClr val="000000"/>
-                          </a:solidFill>
-                          <a:effectLst/>
-                          <a:latin typeface="Arial" panose="020B0604020202020204" pitchFamily="34" charset="0"/>
-                          <a:ea typeface="MS PGothic" panose="020B0600070205080204" pitchFamily="34" charset="-128"/>
-                          <a:cs typeface="Arial" panose="020B0604020202020204" pitchFamily="34" charset="0"/>
-                        </a:rPr>
-                        <a:t>click’s</a:t>
-                      </a:r>
-                      <a:r>
-                        <a:rPr kumimoji="0" lang="pt-BR" altLang="pt-BR" sz="1100" b="0" i="0" u="none" strike="noStrike" cap="none" normalizeH="0" baseline="0" dirty="0">
-                          <a:ln>
-                            <a:noFill/>
-                          </a:ln>
-                          <a:solidFill>
-                            <a:srgbClr val="000000"/>
-                          </a:solidFill>
-                          <a:effectLst/>
-                          <a:latin typeface="Arial" panose="020B0604020202020204" pitchFamily="34" charset="0"/>
-                          <a:ea typeface="MS PGothic" panose="020B0600070205080204" pitchFamily="34" charset="-128"/>
-                          <a:cs typeface="Arial" panose="020B0604020202020204" pitchFamily="34" charset="0"/>
-                        </a:rPr>
-                        <a:t> sobre o lançamento na lista.</a:t>
-                      </a:r>
+                      <a:endParaRPr kumimoji="0" lang="pt-BR" altLang="pt-BR" sz="1100" b="0" i="0" u="none" strike="noStrike" cap="none" normalizeH="0" baseline="0" dirty="0">
+                        <a:ln>
+                          <a:noFill/>
+                        </a:ln>
+                        <a:solidFill>
+                          <a:schemeClr val="tx1"/>
+                        </a:solidFill>
+                        <a:effectLst/>
+                        <a:latin typeface="Arial" panose="020B0604020202020204" pitchFamily="34" charset="0"/>
+                        <a:ea typeface="MS PGothic" panose="020B0600070205080204" pitchFamily="34" charset="-128"/>
+                        <a:cs typeface="Arial" panose="020B0604020202020204" pitchFamily="34" charset="0"/>
+                      </a:endParaRPr>
                     </a:p>
                   </a:txBody>
-                  <a:tcPr marL="53410" marR="53410" marT="29262" marB="27126" horzOverflow="overflow">
-                    <a:lnL w="720" cap="flat" cmpd="sng" algn="ctr">
-                      <a:solidFill>
-                        <a:srgbClr val="FFFFFF"/>
-                      </a:solidFill>
-                      <a:prstDash val="solid"/>
-                      <a:round/>
-                      <a:headEnd type="none" w="med" len="med"/>
-                      <a:tailEnd type="none" w="med" len="med"/>
-                    </a:lnL>
-                    <a:lnR w="720" cap="flat" cmpd="sng" algn="ctr">
-                      <a:solidFill>
-                        <a:srgbClr val="FFFFFF"/>
-                      </a:solidFill>
-                      <a:prstDash val="solid"/>
-                      <a:round/>
-                      <a:headEnd type="none" w="med" len="med"/>
-                      <a:tailEnd type="none" w="med" len="med"/>
-                    </a:lnR>
-                    <a:lnT w="720" cap="flat" cmpd="sng" algn="ctr">
-                      <a:solidFill>
-                        <a:srgbClr val="FFFFFF"/>
-                      </a:solidFill>
-                      <a:prstDash val="solid"/>
-                      <a:round/>
-                      <a:headEnd type="none" w="med" len="med"/>
-                      <a:tailEnd type="none" w="med" len="med"/>
-                    </a:lnT>
-                    <a:lnB w="720" cap="flat" cmpd="sng" algn="ctr">
-                      <a:solidFill>
-                        <a:srgbClr val="FFFFFF"/>
-                      </a:solidFill>
-                      <a:prstDash val="solid"/>
-                      <a:round/>
-                      <a:headEnd type="none" w="med" len="med"/>
-                      <a:tailEnd type="none" w="med" len="med"/>
-                    </a:lnB>
-                    <a:lnTlToBr>
-                      <a:noFill/>
-                    </a:lnTlToBr>
-                    <a:lnBlToTr>
-                      <a:noFill/>
-                    </a:lnBlToTr>
-                    <a:solidFill>
-                      <a:srgbClr val="CCD1E1"/>
-                    </a:solidFill>
-                  </a:tcPr>
+                  <a:tcPr marL="53410" marR="53410" marT="29262" marB="27126" horzOverflow="overflow"/>
                 </a:tc>
                 <a:tc>
                   <a:txBody>
@@ -9952,69 +9447,34 @@
                         </a:tabLst>
                       </a:pPr>
                       <a:r>
-                        <a:rPr kumimoji="0" lang="pt-BR" altLang="pt-BR" sz="1100" b="0" i="0" u="none" strike="noStrike" cap="none" normalizeH="0" baseline="0" dirty="0">
+                        <a:rPr kumimoji="0" lang="pt-BR" altLang="pt-BR" sz="1100" u="none" strike="noStrike" cap="none" normalizeH="0" baseline="0" dirty="0">
                           <a:ln>
                             <a:noFill/>
                           </a:ln>
                           <a:solidFill>
-                            <a:srgbClr val="000000"/>
+                            <a:schemeClr val="tx1"/>
                           </a:solidFill>
                           <a:effectLst/>
                           <a:latin typeface="Arial" panose="020B0604020202020204" pitchFamily="34" charset="0"/>
-                          <a:ea typeface="MS PGothic" panose="020B0600070205080204" pitchFamily="34" charset="-128"/>
                           <a:cs typeface="Arial" panose="020B0604020202020204" pitchFamily="34" charset="0"/>
                         </a:rPr>
-                        <a:t>Deve aparecer uma tela apresentando as informações do lançamento.</a:t>
+                        <a:t>Deve aparecer uma tela apresentando as informações do lançamento, incluindo a notificação.</a:t>
                       </a:r>
+                      <a:endParaRPr kumimoji="0" lang="pt-BR" altLang="pt-BR" sz="1100" b="0" i="0" u="none" strike="noStrike" cap="none" normalizeH="0" baseline="0" dirty="0">
+                        <a:ln>
+                          <a:noFill/>
+                        </a:ln>
+                        <a:solidFill>
+                          <a:schemeClr val="tx1"/>
+                        </a:solidFill>
+                        <a:effectLst/>
+                        <a:latin typeface="Arial" panose="020B0604020202020204" pitchFamily="34" charset="0"/>
+                        <a:ea typeface="MS PGothic" panose="020B0600070205080204" pitchFamily="34" charset="-128"/>
+                        <a:cs typeface="Arial" panose="020B0604020202020204" pitchFamily="34" charset="0"/>
+                      </a:endParaRPr>
                     </a:p>
                   </a:txBody>
-                  <a:tcPr marL="53410" marR="53410" marT="29262" marB="27126" horzOverflow="overflow">
-                    <a:lnL w="720" cap="flat" cmpd="sng" algn="ctr">
-                      <a:solidFill>
-                        <a:srgbClr val="FFFFFF"/>
-                      </a:solidFill>
-                      <a:prstDash val="solid"/>
-                      <a:round/>
-                      <a:headEnd type="none" w="med" len="med"/>
-                      <a:tailEnd type="none" w="med" len="med"/>
-                    </a:lnL>
-                    <a:lnR w="720" cap="flat" cmpd="sng" algn="ctr">
-                      <a:solidFill>
-                        <a:srgbClr val="FFFFFF"/>
-                      </a:solidFill>
-                      <a:prstDash val="solid"/>
-                      <a:round/>
-                      <a:headEnd type="none" w="med" len="med"/>
-                      <a:tailEnd type="none" w="med" len="med"/>
-                    </a:lnR>
-                    <a:lnT w="720" cap="flat" cmpd="sng" algn="ctr">
-                      <a:solidFill>
-                        <a:srgbClr val="FFFFFF"/>
-                      </a:solidFill>
-                      <a:prstDash val="solid"/>
-                      <a:round/>
-                      <a:headEnd type="none" w="med" len="med"/>
-                      <a:tailEnd type="none" w="med" len="med"/>
-                    </a:lnT>
-                    <a:lnB w="720" cap="flat" cmpd="sng" algn="ctr">
-                      <a:solidFill>
-                        <a:srgbClr val="FFFFFF"/>
-                      </a:solidFill>
-                      <a:prstDash val="solid"/>
-                      <a:round/>
-                      <a:headEnd type="none" w="med" len="med"/>
-                      <a:tailEnd type="none" w="med" len="med"/>
-                    </a:lnB>
-                    <a:lnTlToBr>
-                      <a:noFill/>
-                    </a:lnTlToBr>
-                    <a:lnBlToTr>
-                      <a:noFill/>
-                    </a:lnBlToTr>
-                    <a:solidFill>
-                      <a:srgbClr val="CCD1E1"/>
-                    </a:solidFill>
-                  </a:tcPr>
+                  <a:tcPr marL="53410" marR="53410" marT="29262" marB="27126" horzOverflow="overflow"/>
                 </a:tc>
                 <a:extLst>
                   <a:ext uri="{0D108BD9-81ED-4DB2-BD59-A6C34878D82A}">
@@ -10415,69 +9875,34 @@
                         </a:tabLst>
                       </a:pPr>
                       <a:r>
-                        <a:rPr kumimoji="0" lang="pt-BR" altLang="pt-BR" sz="1100" b="0" i="0" u="none" strike="noStrike" cap="none" normalizeH="0" baseline="0" dirty="0">
+                        <a:rPr kumimoji="0" lang="pt-BR" altLang="pt-BR" sz="1100" u="none" strike="noStrike" cap="none" normalizeH="0" baseline="0" dirty="0">
                           <a:ln>
                             <a:noFill/>
                           </a:ln>
                           <a:solidFill>
-                            <a:srgbClr val="000000"/>
+                            <a:schemeClr val="tx1"/>
                           </a:solidFill>
                           <a:effectLst/>
                           <a:latin typeface="Arial" panose="020B0604020202020204" pitchFamily="34" charset="0"/>
-                          <a:ea typeface="MS PGothic" panose="020B0600070205080204" pitchFamily="34" charset="-128"/>
                           <a:cs typeface="Arial" panose="020B0604020202020204" pitchFamily="34" charset="0"/>
                         </a:rPr>
-                        <a:t>2. Informar o valor , o tipo de lançamento recorrente, descrição, selecionar a categoria, selecionar a opção alerta e informar  quanto tempo antes deve ser alertado  e finalizar o procedimento escolhendo “Salvar”.</a:t>
+                        <a:t>2. Informa os dados solicitados para a notificação e finalizar o procedimento escolhendo “Salvar”.</a:t>
                       </a:r>
+                      <a:endParaRPr kumimoji="0" lang="pt-BR" altLang="pt-BR" sz="1100" b="0" i="0" u="none" strike="noStrike" cap="none" normalizeH="0" baseline="0" dirty="0">
+                        <a:ln>
+                          <a:noFill/>
+                        </a:ln>
+                        <a:solidFill>
+                          <a:schemeClr val="tx1"/>
+                        </a:solidFill>
+                        <a:effectLst/>
+                        <a:latin typeface="Arial" panose="020B0604020202020204" pitchFamily="34" charset="0"/>
+                        <a:ea typeface="MS PGothic" panose="020B0600070205080204" pitchFamily="34" charset="-128"/>
+                        <a:cs typeface="Arial" panose="020B0604020202020204" pitchFamily="34" charset="0"/>
+                      </a:endParaRPr>
                     </a:p>
                   </a:txBody>
-                  <a:tcPr marL="53410" marR="53410" marT="29262" marB="27126" horzOverflow="overflow">
-                    <a:lnL w="720" cap="flat" cmpd="sng" algn="ctr">
-                      <a:solidFill>
-                        <a:srgbClr val="FFFFFF"/>
-                      </a:solidFill>
-                      <a:prstDash val="solid"/>
-                      <a:round/>
-                      <a:headEnd type="none" w="med" len="med"/>
-                      <a:tailEnd type="none" w="med" len="med"/>
-                    </a:lnL>
-                    <a:lnR w="720" cap="flat" cmpd="sng" algn="ctr">
-                      <a:solidFill>
-                        <a:srgbClr val="FFFFFF"/>
-                      </a:solidFill>
-                      <a:prstDash val="solid"/>
-                      <a:round/>
-                      <a:headEnd type="none" w="med" len="med"/>
-                      <a:tailEnd type="none" w="med" len="med"/>
-                    </a:lnR>
-                    <a:lnT w="720" cap="flat" cmpd="sng" algn="ctr">
-                      <a:solidFill>
-                        <a:srgbClr val="FFFFFF"/>
-                      </a:solidFill>
-                      <a:prstDash val="solid"/>
-                      <a:round/>
-                      <a:headEnd type="none" w="med" len="med"/>
-                      <a:tailEnd type="none" w="med" len="med"/>
-                    </a:lnT>
-                    <a:lnB w="720" cap="flat" cmpd="sng" algn="ctr">
-                      <a:solidFill>
-                        <a:srgbClr val="FFFFFF"/>
-                      </a:solidFill>
-                      <a:prstDash val="solid"/>
-                      <a:round/>
-                      <a:headEnd type="none" w="med" len="med"/>
-                      <a:tailEnd type="none" w="med" len="med"/>
-                    </a:lnB>
-                    <a:lnTlToBr>
-                      <a:noFill/>
-                    </a:lnTlToBr>
-                    <a:lnBlToTr>
-                      <a:noFill/>
-                    </a:lnBlToTr>
-                    <a:solidFill>
-                      <a:srgbClr val="E8E9F1"/>
-                    </a:solidFill>
-                  </a:tcPr>
+                  <a:tcPr marL="53410" marR="53410" marT="29262" marB="27126" horzOverflow="overflow"/>
                 </a:tc>
                 <a:tc>
                   <a:txBody>
@@ -10834,7 +10259,7 @@
                     <a:p>
                       <a:pPr marL="0" marR="0" lvl="0" indent="0" algn="just" defTabSz="449263" rtl="0" eaLnBrk="1" fontAlgn="base" latinLnBrk="0" hangingPunct="1">
                         <a:lnSpc>
-                          <a:spcPct val="80000"/>
+                          <a:spcPct val="100000"/>
                         </a:lnSpc>
                         <a:spcBef>
                           <a:spcPct val="0"/>
@@ -10871,69 +10296,58 @@
                         </a:tabLst>
                       </a:pPr>
                       <a:r>
-                        <a:rPr kumimoji="0" lang="pt-BR" altLang="pt-BR" sz="1100" b="0" i="0" u="none" strike="noStrike" cap="none" normalizeH="0" baseline="0" dirty="0">
+                        <a:rPr kumimoji="0" lang="pt-BR" altLang="pt-BR" sz="1100" u="none" strike="noStrike" cap="none" normalizeH="0" baseline="0" dirty="0">
                           <a:ln>
                             <a:noFill/>
                           </a:ln>
                           <a:solidFill>
-                            <a:srgbClr val="000000"/>
+                            <a:schemeClr val="tx1"/>
                           </a:solidFill>
                           <a:effectLst/>
                           <a:latin typeface="Arial" panose="020B0604020202020204" pitchFamily="34" charset="0"/>
-                          <a:ea typeface="MS PGothic" panose="020B0600070205080204" pitchFamily="34" charset="-128"/>
                           <a:cs typeface="Arial" panose="020B0604020202020204" pitchFamily="34" charset="0"/>
                         </a:rPr>
-                        <a:t>Aparece uma tela com a seguinte mensagem: “Lançamento atualizado com sucesso”.</a:t>
+                        <a:t>Aparece uma tela com a seguinte mensagem: “</a:t>
                       </a:r>
+                      <a:r>
+                        <a:rPr lang="pt-BR" sz="1100" dirty="0">
+                          <a:solidFill>
+                            <a:schemeClr val="tx1"/>
+                          </a:solidFill>
+                          <a:latin typeface="Arial" panose="020B0604020202020204" pitchFamily="34" charset="0"/>
+                          <a:cs typeface="Arial" panose="020B0604020202020204" pitchFamily="34" charset="0"/>
+                        </a:rPr>
+                        <a:t>Salvo com sucesso!</a:t>
+                      </a:r>
+                      <a:r>
+                        <a:rPr kumimoji="0" lang="pt-BR" altLang="pt-BR" sz="1100" u="none" strike="noStrike" cap="none" normalizeH="0" baseline="0" dirty="0">
+                          <a:ln>
+                            <a:noFill/>
+                          </a:ln>
+                          <a:solidFill>
+                            <a:schemeClr val="tx1"/>
+                          </a:solidFill>
+                          <a:effectLst/>
+                          <a:latin typeface="Arial" panose="020B0604020202020204" pitchFamily="34" charset="0"/>
+                          <a:cs typeface="Arial" panose="020B0604020202020204" pitchFamily="34" charset="0"/>
+                        </a:rPr>
+                        <a:t>”.</a:t>
+                      </a:r>
+                      <a:endParaRPr kumimoji="0" lang="pt-BR" altLang="pt-BR" sz="1100" b="0" i="0" u="none" strike="noStrike" cap="none" normalizeH="0" baseline="0" dirty="0">
+                        <a:ln>
+                          <a:noFill/>
+                        </a:ln>
+                        <a:solidFill>
+                          <a:schemeClr val="tx1"/>
+                        </a:solidFill>
+                        <a:effectLst/>
+                        <a:latin typeface="Arial" panose="020B0604020202020204" pitchFamily="34" charset="0"/>
+                        <a:ea typeface="MS PGothic" panose="020B0600070205080204" pitchFamily="34" charset="-128"/>
+                        <a:cs typeface="Arial" panose="020B0604020202020204" pitchFamily="34" charset="0"/>
+                      </a:endParaRPr>
                     </a:p>
                   </a:txBody>
-                  <a:tcPr marL="53410" marR="53410" marT="29262" marB="27126" horzOverflow="overflow">
-                    <a:lnL w="720" cap="flat" cmpd="sng" algn="ctr">
-                      <a:solidFill>
-                        <a:srgbClr val="FFFFFF"/>
-                      </a:solidFill>
-                      <a:prstDash val="solid"/>
-                      <a:round/>
-                      <a:headEnd type="none" w="med" len="med"/>
-                      <a:tailEnd type="none" w="med" len="med"/>
-                    </a:lnL>
-                    <a:lnR w="720" cap="flat" cmpd="sng" algn="ctr">
-                      <a:solidFill>
-                        <a:srgbClr val="FFFFFF"/>
-                      </a:solidFill>
-                      <a:prstDash val="solid"/>
-                      <a:round/>
-                      <a:headEnd type="none" w="med" len="med"/>
-                      <a:tailEnd type="none" w="med" len="med"/>
-                    </a:lnR>
-                    <a:lnT w="720" cap="flat" cmpd="sng" algn="ctr">
-                      <a:solidFill>
-                        <a:srgbClr val="FFFFFF"/>
-                      </a:solidFill>
-                      <a:prstDash val="solid"/>
-                      <a:round/>
-                      <a:headEnd type="none" w="med" len="med"/>
-                      <a:tailEnd type="none" w="med" len="med"/>
-                    </a:lnT>
-                    <a:lnB w="720" cap="flat" cmpd="sng" algn="ctr">
-                      <a:solidFill>
-                        <a:srgbClr val="FFFFFF"/>
-                      </a:solidFill>
-                      <a:prstDash val="solid"/>
-                      <a:round/>
-                      <a:headEnd type="none" w="med" len="med"/>
-                      <a:tailEnd type="none" w="med" len="med"/>
-                    </a:lnB>
-                    <a:lnTlToBr>
-                      <a:noFill/>
-                    </a:lnTlToBr>
-                    <a:lnBlToTr>
-                      <a:noFill/>
-                    </a:lnBlToTr>
-                    <a:solidFill>
-                      <a:srgbClr val="E8E9F1"/>
-                    </a:solidFill>
-                  </a:tcPr>
+                  <a:tcPr marL="53410" marR="53410" marT="29262" marB="27126" horzOverflow="overflow"/>
                 </a:tc>
                 <a:extLst>
                   <a:ext uri="{0D108BD9-81ED-4DB2-BD59-A6C34878D82A}">
@@ -10995,13 +10409,25 @@
               <a:defRPr/>
             </a:pPr>
             <a:fld id="{54C29DE4-ACF1-41B6-8416-EBE6F96C0E29}" type="slidenum">
-              <a:rPr lang="pt-BR" altLang="es-PY" smtClean="0"/>
+              <a:rPr lang="pt-BR" altLang="es-PY" sz="1100" smtClean="0">
+                <a:solidFill>
+                  <a:schemeClr val="tx1"/>
+                </a:solidFill>
+                <a:latin typeface="Arial" panose="020B0604020202020204" pitchFamily="34" charset="0"/>
+                <a:cs typeface="Arial" panose="020B0604020202020204" pitchFamily="34" charset="0"/>
+              </a:rPr>
               <a:pPr>
                 <a:defRPr/>
               </a:pPr>
               <a:t>3</a:t>
             </a:fld>
-            <a:endParaRPr lang="pt-BR" altLang="es-PY"/>
+            <a:endParaRPr lang="pt-BR" altLang="es-PY" sz="1100">
+              <a:solidFill>
+                <a:schemeClr val="tx1"/>
+              </a:solidFill>
+              <a:latin typeface="Arial" panose="020B0604020202020204" pitchFamily="34" charset="0"/>
+              <a:cs typeface="Arial" panose="020B0604020202020204" pitchFamily="34" charset="0"/>
+            </a:endParaRPr>
           </a:p>
         </p:txBody>
       </p:sp>
@@ -11020,7 +10446,7 @@
           <p:nvPr>
             <p:extLst>
               <p:ext uri="{D42A27DB-BD31-4B8C-83A1-F6EECF244321}">
-                <p14:modId xmlns:p14="http://schemas.microsoft.com/office/powerpoint/2010/main" val="2134879461"/>
+                <p14:modId xmlns:p14="http://schemas.microsoft.com/office/powerpoint/2010/main" val="1739265956"/>
               </p:ext>
             </p:extLst>
           </p:nvPr>
@@ -11032,7 +10458,9 @@
         <a:graphic>
           <a:graphicData uri="http://schemas.openxmlformats.org/drawingml/2006/table">
             <a:tbl>
-              <a:tblPr/>
+              <a:tblPr>
+                <a:tableStyleId>{69CF1AB2-1976-4502-BF36-3FF5EA218861}</a:tableStyleId>
+              </a:tblPr>
               <a:tblGrid>
                 <a:gridCol w="2610155">
                   <a:extLst>
@@ -11442,63 +10870,31 @@
                         </a:tabLst>
                       </a:pPr>
                       <a:r>
-                        <a:rPr kumimoji="0" lang="pt-BR" altLang="pt-BR" sz="1100" b="0" i="0" u="none" strike="noStrike" cap="none" normalizeH="0" baseline="0" dirty="0">
+                        <a:rPr kumimoji="0" lang="pt-BR" altLang="pt-BR" sz="1100" u="none" strike="noStrike" cap="none" normalizeH="0" baseline="0" dirty="0">
                           <a:ln>
                             <a:noFill/>
                           </a:ln>
-                          <a:solidFill>
-                            <a:srgbClr val="FFFFFF"/>
-                          </a:solidFill>
                           <a:effectLst/>
                           <a:latin typeface="Arial" panose="020B0604020202020204" pitchFamily="34" charset="0"/>
-                          <a:ea typeface="MS PGothic" panose="020B0600070205080204" pitchFamily="34" charset="-128"/>
                           <a:cs typeface="Arial" panose="020B0604020202020204" pitchFamily="34" charset="0"/>
                         </a:rPr>
                         <a:t>CT07.3 – Notificação sem tempo determinado.</a:t>
                       </a:r>
+                      <a:endParaRPr kumimoji="0" lang="pt-BR" altLang="pt-BR" sz="1100" b="0" i="0" u="none" strike="noStrike" cap="none" normalizeH="0" baseline="0" dirty="0">
+                        <a:ln>
+                          <a:noFill/>
+                        </a:ln>
+                        <a:solidFill>
+                          <a:schemeClr val="tx1"/>
+                        </a:solidFill>
+                        <a:effectLst/>
+                        <a:latin typeface="Arial" panose="020B0604020202020204" pitchFamily="34" charset="0"/>
+                        <a:ea typeface="MS PGothic" panose="020B0600070205080204" pitchFamily="34" charset="-128"/>
+                        <a:cs typeface="Arial" panose="020B0604020202020204" pitchFamily="34" charset="0"/>
+                      </a:endParaRPr>
                     </a:p>
                   </a:txBody>
-                  <a:tcPr marL="53410" marR="53410" marT="29903" marB="27126" horzOverflow="overflow">
-                    <a:lnL w="720" cap="flat" cmpd="sng" algn="ctr">
-                      <a:solidFill>
-                        <a:srgbClr val="FFFFFF"/>
-                      </a:solidFill>
-                      <a:prstDash val="solid"/>
-                      <a:round/>
-                      <a:headEnd type="none" w="med" len="med"/>
-                      <a:tailEnd type="none" w="med" len="med"/>
-                    </a:lnL>
-                    <a:lnR>
-                      <a:noFill/>
-                    </a:lnR>
-                    <a:lnT w="720" cap="flat" cmpd="sng" algn="ctr">
-                      <a:solidFill>
-                        <a:srgbClr val="FFFFFF"/>
-                      </a:solidFill>
-                      <a:prstDash val="solid"/>
-                      <a:round/>
-                      <a:headEnd type="none" w="med" len="med"/>
-                      <a:tailEnd type="none" w="med" len="med"/>
-                    </a:lnT>
-                    <a:lnB w="720" cap="flat" cmpd="sng" algn="ctr">
-                      <a:solidFill>
-                        <a:srgbClr val="FFFFFF"/>
-                      </a:solidFill>
-                      <a:prstDash val="solid"/>
-                      <a:round/>
-                      <a:headEnd type="none" w="med" len="med"/>
-                      <a:tailEnd type="none" w="med" len="med"/>
-                    </a:lnB>
-                    <a:lnTlToBr>
-                      <a:noFill/>
-                    </a:lnTlToBr>
-                    <a:lnBlToTr>
-                      <a:noFill/>
-                    </a:lnBlToTr>
-                    <a:solidFill>
-                      <a:srgbClr val="80B5E2"/>
-                    </a:solidFill>
-                  </a:tcPr>
+                  <a:tcPr marL="53410" marR="53410" marT="29903" marB="27126" horzOverflow="overflow"/>
                 </a:tc>
                 <a:tc hMerge="1">
                   <a:txBody>
@@ -11909,63 +11305,31 @@
                         </a:tabLst>
                       </a:pPr>
                       <a:r>
-                        <a:rPr kumimoji="0" lang="pt-BR" altLang="pt-BR" sz="1100" b="0" i="0" u="none" strike="noStrike" cap="none" normalizeH="0" baseline="0" dirty="0">
+                        <a:rPr kumimoji="0" lang="pt-BR" altLang="pt-BR" sz="1100" u="none" strike="noStrike" cap="none" normalizeH="0" baseline="0" dirty="0">
                           <a:ln>
                             <a:noFill/>
                           </a:ln>
-                          <a:solidFill>
-                            <a:srgbClr val="000000"/>
-                          </a:solidFill>
                           <a:effectLst/>
                           <a:latin typeface="Arial" panose="020B0604020202020204" pitchFamily="34" charset="0"/>
-                          <a:ea typeface="MS PGothic" panose="020B0600070205080204" pitchFamily="34" charset="-128"/>
                           <a:cs typeface="Arial" panose="020B0604020202020204" pitchFamily="34" charset="0"/>
                         </a:rPr>
                         <a:t>Pré-condição: O usuário deve estar autenticado no sistema.</a:t>
                       </a:r>
+                      <a:endParaRPr kumimoji="0" lang="pt-BR" altLang="pt-BR" sz="1100" b="0" i="0" u="none" strike="noStrike" cap="none" normalizeH="0" baseline="0" dirty="0">
+                        <a:ln>
+                          <a:noFill/>
+                        </a:ln>
+                        <a:solidFill>
+                          <a:schemeClr val="tx1"/>
+                        </a:solidFill>
+                        <a:effectLst/>
+                        <a:latin typeface="Arial" panose="020B0604020202020204" pitchFamily="34" charset="0"/>
+                        <a:ea typeface="MS PGothic" panose="020B0600070205080204" pitchFamily="34" charset="-128"/>
+                        <a:cs typeface="Arial" panose="020B0604020202020204" pitchFamily="34" charset="0"/>
+                      </a:endParaRPr>
                     </a:p>
                   </a:txBody>
-                  <a:tcPr marL="53410" marR="53410" marT="29903" marB="27126" horzOverflow="overflow">
-                    <a:lnL w="720" cap="flat" cmpd="sng" algn="ctr">
-                      <a:solidFill>
-                        <a:srgbClr val="FFFFFF"/>
-                      </a:solidFill>
-                      <a:prstDash val="solid"/>
-                      <a:round/>
-                      <a:headEnd type="none" w="med" len="med"/>
-                      <a:tailEnd type="none" w="med" len="med"/>
-                    </a:lnL>
-                    <a:lnR>
-                      <a:noFill/>
-                    </a:lnR>
-                    <a:lnT w="720" cap="flat" cmpd="sng" algn="ctr">
-                      <a:solidFill>
-                        <a:srgbClr val="FFFFFF"/>
-                      </a:solidFill>
-                      <a:prstDash val="solid"/>
-                      <a:round/>
-                      <a:headEnd type="none" w="med" len="med"/>
-                      <a:tailEnd type="none" w="med" len="med"/>
-                    </a:lnT>
-                    <a:lnB w="720" cap="flat" cmpd="sng" algn="ctr">
-                      <a:solidFill>
-                        <a:srgbClr val="FFFFFF"/>
-                      </a:solidFill>
-                      <a:prstDash val="solid"/>
-                      <a:round/>
-                      <a:headEnd type="none" w="med" len="med"/>
-                      <a:tailEnd type="none" w="med" len="med"/>
-                    </a:lnB>
-                    <a:lnTlToBr>
-                      <a:noFill/>
-                    </a:lnTlToBr>
-                    <a:lnBlToTr>
-                      <a:noFill/>
-                    </a:lnBlToTr>
-                    <a:solidFill>
-                      <a:srgbClr val="CCD1E1"/>
-                    </a:solidFill>
-                  </a:tcPr>
+                  <a:tcPr marL="53410" marR="53410" marT="29903" marB="27126" horzOverflow="overflow"/>
                 </a:tc>
                 <a:tc hMerge="1">
                   <a:txBody>
@@ -12376,69 +11740,31 @@
                         </a:tabLst>
                       </a:pPr>
                       <a:r>
-                        <a:rPr kumimoji="0" lang="pt-BR" altLang="pt-BR" sz="1100" b="0" i="1" u="none" strike="noStrike" cap="none" normalizeH="0" baseline="0">
+                        <a:rPr kumimoji="0" lang="pt-BR" altLang="pt-BR" sz="1100" u="none" strike="noStrike" cap="none" normalizeH="0" baseline="0">
                           <a:ln>
                             <a:noFill/>
                           </a:ln>
-                          <a:solidFill>
-                            <a:srgbClr val="2469A6"/>
-                          </a:solidFill>
                           <a:effectLst/>
                           <a:latin typeface="Arial" panose="020B0604020202020204" pitchFamily="34" charset="0"/>
-                          <a:ea typeface="MS PGothic" panose="020B0600070205080204" pitchFamily="34" charset="-128"/>
                           <a:cs typeface="Arial" panose="020B0604020202020204" pitchFamily="34" charset="0"/>
                         </a:rPr>
                         <a:t>Procedimentos</a:t>
                       </a:r>
+                      <a:endParaRPr kumimoji="0" lang="pt-BR" altLang="pt-BR" sz="1100" b="0" i="1" u="none" strike="noStrike" cap="none" normalizeH="0" baseline="0">
+                        <a:ln>
+                          <a:noFill/>
+                        </a:ln>
+                        <a:solidFill>
+                          <a:schemeClr val="tx1"/>
+                        </a:solidFill>
+                        <a:effectLst/>
+                        <a:latin typeface="Arial" panose="020B0604020202020204" pitchFamily="34" charset="0"/>
+                        <a:ea typeface="MS PGothic" panose="020B0600070205080204" pitchFamily="34" charset="-128"/>
+                        <a:cs typeface="Arial" panose="020B0604020202020204" pitchFamily="34" charset="0"/>
+                      </a:endParaRPr>
                     </a:p>
                   </a:txBody>
-                  <a:tcPr marL="53410" marR="53410" marT="29476" marB="27126" horzOverflow="overflow">
-                    <a:lnL w="720" cap="flat" cmpd="sng" algn="ctr">
-                      <a:solidFill>
-                        <a:srgbClr val="FFFFFF"/>
-                      </a:solidFill>
-                      <a:prstDash val="solid"/>
-                      <a:round/>
-                      <a:headEnd type="none" w="med" len="med"/>
-                      <a:tailEnd type="none" w="med" len="med"/>
-                    </a:lnL>
-                    <a:lnR w="720" cap="flat" cmpd="sng" algn="ctr">
-                      <a:solidFill>
-                        <a:srgbClr val="FFFFFF"/>
-                      </a:solidFill>
-                      <a:prstDash val="solid"/>
-                      <a:round/>
-                      <a:headEnd type="none" w="med" len="med"/>
-                      <a:tailEnd type="none" w="med" len="med"/>
-                    </a:lnR>
-                    <a:lnT w="720" cap="flat" cmpd="sng" algn="ctr">
-                      <a:solidFill>
-                        <a:srgbClr val="FFFFFF"/>
-                      </a:solidFill>
-                      <a:prstDash val="solid"/>
-                      <a:round/>
-                      <a:headEnd type="none" w="med" len="med"/>
-                      <a:tailEnd type="none" w="med" len="med"/>
-                    </a:lnT>
-                    <a:lnB w="720" cap="flat" cmpd="sng" algn="ctr">
-                      <a:solidFill>
-                        <a:srgbClr val="FFFFFF"/>
-                      </a:solidFill>
-                      <a:prstDash val="solid"/>
-                      <a:round/>
-                      <a:headEnd type="none" w="med" len="med"/>
-                      <a:tailEnd type="none" w="med" len="med"/>
-                    </a:lnB>
-                    <a:lnTlToBr>
-                      <a:noFill/>
-                    </a:lnTlToBr>
-                    <a:lnBlToTr>
-                      <a:noFill/>
-                    </a:lnBlToTr>
-                    <a:solidFill>
-                      <a:srgbClr val="E8E9F1"/>
-                    </a:solidFill>
-                  </a:tcPr>
+                  <a:tcPr marL="53410" marR="53410" marT="29476" marB="27126" horzOverflow="overflow"/>
                 </a:tc>
                 <a:tc>
                   <a:txBody>
@@ -12832,63 +12158,31 @@
                         </a:tabLst>
                       </a:pPr>
                       <a:r>
-                        <a:rPr kumimoji="0" lang="pt-BR" altLang="pt-BR" sz="1100" b="0" i="1" u="none" strike="noStrike" cap="none" normalizeH="0" baseline="0">
+                        <a:rPr kumimoji="0" lang="pt-BR" altLang="pt-BR" sz="1100" u="none" strike="noStrike" cap="none" normalizeH="0" baseline="0">
                           <a:ln>
                             <a:noFill/>
                           </a:ln>
-                          <a:solidFill>
-                            <a:srgbClr val="2469A6"/>
-                          </a:solidFill>
                           <a:effectLst/>
                           <a:latin typeface="Arial" panose="020B0604020202020204" pitchFamily="34" charset="0"/>
-                          <a:ea typeface="MS PGothic" panose="020B0600070205080204" pitchFamily="34" charset="-128"/>
                           <a:cs typeface="Arial" panose="020B0604020202020204" pitchFamily="34" charset="0"/>
                         </a:rPr>
                         <a:t>Resultado Esperado</a:t>
                       </a:r>
+                      <a:endParaRPr kumimoji="0" lang="pt-BR" altLang="pt-BR" sz="1100" b="0" i="1" u="none" strike="noStrike" cap="none" normalizeH="0" baseline="0">
+                        <a:ln>
+                          <a:noFill/>
+                        </a:ln>
+                        <a:solidFill>
+                          <a:schemeClr val="tx1"/>
+                        </a:solidFill>
+                        <a:effectLst/>
+                        <a:latin typeface="Arial" panose="020B0604020202020204" pitchFamily="34" charset="0"/>
+                        <a:ea typeface="MS PGothic" panose="020B0600070205080204" pitchFamily="34" charset="-128"/>
+                        <a:cs typeface="Arial" panose="020B0604020202020204" pitchFamily="34" charset="0"/>
+                      </a:endParaRPr>
                     </a:p>
                   </a:txBody>
-                  <a:tcPr marL="53410" marR="53410" marT="29476" marB="27126" horzOverflow="overflow">
-                    <a:lnL w="720" cap="flat" cmpd="sng" algn="ctr">
-                      <a:solidFill>
-                        <a:srgbClr val="FFFFFF"/>
-                      </a:solidFill>
-                      <a:prstDash val="solid"/>
-                      <a:round/>
-                      <a:headEnd type="none" w="med" len="med"/>
-                      <a:tailEnd type="none" w="med" len="med"/>
-                    </a:lnL>
-                    <a:lnR w="720" cap="flat" cmpd="sng" algn="ctr">
-                      <a:solidFill>
-                        <a:srgbClr val="FFFFFF"/>
-                      </a:solidFill>
-                      <a:prstDash val="solid"/>
-                      <a:round/>
-                      <a:headEnd type="none" w="med" len="med"/>
-                      <a:tailEnd type="none" w="med" len="med"/>
-                    </a:lnR>
-                    <a:lnT>
-                      <a:noFill/>
-                    </a:lnT>
-                    <a:lnB w="720" cap="flat" cmpd="sng" algn="ctr">
-                      <a:solidFill>
-                        <a:srgbClr val="FFFFFF"/>
-                      </a:solidFill>
-                      <a:prstDash val="solid"/>
-                      <a:round/>
-                      <a:headEnd type="none" w="med" len="med"/>
-                      <a:tailEnd type="none" w="med" len="med"/>
-                    </a:lnB>
-                    <a:lnTlToBr>
-                      <a:noFill/>
-                    </a:lnTlToBr>
-                    <a:lnBlToTr>
-                      <a:noFill/>
-                    </a:lnBlToTr>
-                    <a:solidFill>
-                      <a:srgbClr val="E8E9F1"/>
-                    </a:solidFill>
-                  </a:tcPr>
+                  <a:tcPr marL="53410" marR="53410" marT="29476" marB="27126" horzOverflow="overflow"/>
                 </a:tc>
                 <a:extLst>
                   <a:ext uri="{0D108BD9-81ED-4DB2-BD59-A6C34878D82A}">
@@ -13287,71 +12581,74 @@
                           <a:tab pos="8534400" algn="l"/>
                           <a:tab pos="8983663" algn="l"/>
                         </a:tabLst>
+                        <a:defRPr/>
                       </a:pPr>
                       <a:r>
-                        <a:rPr kumimoji="0" lang="pt-BR" altLang="pt-BR" sz="1100" b="0" i="0" u="none" strike="noStrike" cap="none" normalizeH="0" baseline="0" dirty="0">
+                        <a:rPr kumimoji="0" lang="pt-BR" altLang="pt-BR" sz="1100" u="none" strike="noStrike" cap="none" normalizeH="0" baseline="0" dirty="0">
                           <a:ln>
                             <a:noFill/>
                           </a:ln>
-                          <a:solidFill>
-                            <a:srgbClr val="000000"/>
-                          </a:solidFill>
                           <a:effectLst/>
                           <a:latin typeface="Arial" panose="020B0604020202020204" pitchFamily="34" charset="0"/>
-                          <a:ea typeface="MS PGothic" panose="020B0600070205080204" pitchFamily="34" charset="-128"/>
                           <a:cs typeface="Arial" panose="020B0604020202020204" pitchFamily="34" charset="0"/>
                         </a:rPr>
-                        <a:t>1. Escolher a opção “Adicionar Lançamento”</a:t>
+                        <a:t>1. Escolher a opção “Criar Lançamento”.</a:t>
                       </a:r>
                     </a:p>
+                    <a:p>
+                      <a:pPr marL="0" marR="0" lvl="0" indent="0" algn="l" defTabSz="449263" rtl="0" eaLnBrk="1" fontAlgn="base" latinLnBrk="0" hangingPunct="1">
+                        <a:lnSpc>
+                          <a:spcPct val="80000"/>
+                        </a:lnSpc>
+                        <a:spcBef>
+                          <a:spcPct val="0"/>
+                        </a:spcBef>
+                        <a:spcAft>
+                          <a:spcPct val="0"/>
+                        </a:spcAft>
+                        <a:buClrTx/>
+                        <a:buSzPct val="100000"/>
+                        <a:buFontTx/>
+                        <a:buNone/>
+                        <a:tabLst>
+                          <a:tab pos="0" algn="l"/>
+                          <a:tab pos="447675" algn="l"/>
+                          <a:tab pos="896938" algn="l"/>
+                          <a:tab pos="1346200" algn="l"/>
+                          <a:tab pos="1795463" algn="l"/>
+                          <a:tab pos="2244725" algn="l"/>
+                          <a:tab pos="2693988" algn="l"/>
+                          <a:tab pos="3143250" algn="l"/>
+                          <a:tab pos="3592513" algn="l"/>
+                          <a:tab pos="4041775" algn="l"/>
+                          <a:tab pos="4491038" algn="l"/>
+                          <a:tab pos="4940300" algn="l"/>
+                          <a:tab pos="5389563" algn="l"/>
+                          <a:tab pos="5838825" algn="l"/>
+                          <a:tab pos="6288088" algn="l"/>
+                          <a:tab pos="6737350" algn="l"/>
+                          <a:tab pos="7186613" algn="l"/>
+                          <a:tab pos="7635875" algn="l"/>
+                          <a:tab pos="8085138" algn="l"/>
+                          <a:tab pos="8534400" algn="l"/>
+                          <a:tab pos="8983663" algn="l"/>
+                        </a:tabLst>
+                      </a:pPr>
+                      <a:endParaRPr kumimoji="0" lang="pt-BR" altLang="pt-BR" sz="1100" b="0" i="0" u="none" strike="noStrike" cap="none" normalizeH="0" baseline="0" dirty="0">
+                        <a:ln>
+                          <a:noFill/>
+                        </a:ln>
+                        <a:solidFill>
+                          <a:schemeClr val="tx1"/>
+                        </a:solidFill>
+                        <a:effectLst/>
+                        <a:latin typeface="Arial" panose="020B0604020202020204" pitchFamily="34" charset="0"/>
+                        <a:ea typeface="MS PGothic" panose="020B0600070205080204" pitchFamily="34" charset="-128"/>
+                        <a:cs typeface="Arial" panose="020B0604020202020204" pitchFamily="34" charset="0"/>
+                      </a:endParaRPr>
+                    </a:p>
                   </a:txBody>
-                  <a:tcPr marL="53410" marR="53410" marT="29262" marB="27126" horzOverflow="overflow">
-                    <a:lnL w="720" cap="flat" cmpd="sng" algn="ctr">
-                      <a:solidFill>
-                        <a:srgbClr val="FFFFFF"/>
-                      </a:solidFill>
-                      <a:prstDash val="solid"/>
-                      <a:round/>
-                      <a:headEnd type="none" w="med" len="med"/>
-                      <a:tailEnd type="none" w="med" len="med"/>
-                    </a:lnL>
-                    <a:lnR w="720" cap="flat" cmpd="sng" algn="ctr">
-                      <a:solidFill>
-                        <a:srgbClr val="FFFFFF"/>
-                      </a:solidFill>
-                      <a:prstDash val="solid"/>
-                      <a:round/>
-                      <a:headEnd type="none" w="med" len="med"/>
-                      <a:tailEnd type="none" w="med" len="med"/>
-                    </a:lnR>
-                    <a:lnT w="720" cap="flat" cmpd="sng" algn="ctr">
-                      <a:solidFill>
-                        <a:srgbClr val="FFFFFF"/>
-                      </a:solidFill>
-                      <a:prstDash val="solid"/>
-                      <a:round/>
-                      <a:headEnd type="none" w="med" len="med"/>
-                      <a:tailEnd type="none" w="med" len="med"/>
-                    </a:lnT>
-                    <a:lnB w="720" cap="flat" cmpd="sng" algn="ctr">
-                      <a:solidFill>
-                        <a:srgbClr val="FFFFFF"/>
-                      </a:solidFill>
-                      <a:prstDash val="solid"/>
-                      <a:round/>
-                      <a:headEnd type="none" w="med" len="med"/>
-                      <a:tailEnd type="none" w="med" len="med"/>
-                    </a:lnB>
-                    <a:lnTlToBr>
-                      <a:noFill/>
-                    </a:lnTlToBr>
-                    <a:lnBlToTr>
-                      <a:noFill/>
-                    </a:lnBlToTr>
-                    <a:solidFill>
-                      <a:srgbClr val="CCD1E1"/>
-                    </a:solidFill>
-                  </a:tcPr>
+                  <a:tcPr marL="53410" marR="53410" marT="29262" marB="27126" horzOverflow="overflow"/>
                 </a:tc>
                 <a:tc>
                   <a:txBody>
@@ -13745,69 +13042,31 @@
                         </a:tabLst>
                       </a:pPr>
                       <a:r>
-                        <a:rPr kumimoji="0" lang="pt-BR" altLang="pt-BR" sz="1100" b="0" i="0" u="none" strike="noStrike" cap="none" normalizeH="0" baseline="0">
+                        <a:rPr kumimoji="0" lang="pt-BR" altLang="pt-BR" sz="1100" u="none" strike="noStrike" cap="none" normalizeH="0" baseline="0" dirty="0">
                           <a:ln>
                             <a:noFill/>
                           </a:ln>
-                          <a:solidFill>
-                            <a:srgbClr val="000000"/>
-                          </a:solidFill>
                           <a:effectLst/>
                           <a:latin typeface="Arial" panose="020B0604020202020204" pitchFamily="34" charset="0"/>
-                          <a:ea typeface="MS PGothic" panose="020B0600070205080204" pitchFamily="34" charset="-128"/>
                           <a:cs typeface="Arial" panose="020B0604020202020204" pitchFamily="34" charset="0"/>
                         </a:rPr>
-                        <a:t>Deve aparecer uma tela solicitando as informações do lancamento.</a:t>
+                        <a:t>Deve aparecer uma tela solicitando as informações do lançamento.</a:t>
                       </a:r>
+                      <a:endParaRPr kumimoji="0" lang="pt-BR" altLang="pt-BR" sz="1100" b="0" i="0" u="none" strike="noStrike" cap="none" normalizeH="0" baseline="0" dirty="0">
+                        <a:ln>
+                          <a:noFill/>
+                        </a:ln>
+                        <a:solidFill>
+                          <a:schemeClr val="tx1"/>
+                        </a:solidFill>
+                        <a:effectLst/>
+                        <a:latin typeface="Arial" panose="020B0604020202020204" pitchFamily="34" charset="0"/>
+                        <a:ea typeface="MS PGothic" panose="020B0600070205080204" pitchFamily="34" charset="-128"/>
+                        <a:cs typeface="Arial" panose="020B0604020202020204" pitchFamily="34" charset="0"/>
+                      </a:endParaRPr>
                     </a:p>
                   </a:txBody>
-                  <a:tcPr marL="53410" marR="53410" marT="29262" marB="27126" horzOverflow="overflow">
-                    <a:lnL w="720" cap="flat" cmpd="sng" algn="ctr">
-                      <a:solidFill>
-                        <a:srgbClr val="FFFFFF"/>
-                      </a:solidFill>
-                      <a:prstDash val="solid"/>
-                      <a:round/>
-                      <a:headEnd type="none" w="med" len="med"/>
-                      <a:tailEnd type="none" w="med" len="med"/>
-                    </a:lnL>
-                    <a:lnR w="720" cap="flat" cmpd="sng" algn="ctr">
-                      <a:solidFill>
-                        <a:srgbClr val="FFFFFF"/>
-                      </a:solidFill>
-                      <a:prstDash val="solid"/>
-                      <a:round/>
-                      <a:headEnd type="none" w="med" len="med"/>
-                      <a:tailEnd type="none" w="med" len="med"/>
-                    </a:lnR>
-                    <a:lnT w="720" cap="flat" cmpd="sng" algn="ctr">
-                      <a:solidFill>
-                        <a:srgbClr val="FFFFFF"/>
-                      </a:solidFill>
-                      <a:prstDash val="solid"/>
-                      <a:round/>
-                      <a:headEnd type="none" w="med" len="med"/>
-                      <a:tailEnd type="none" w="med" len="med"/>
-                    </a:lnT>
-                    <a:lnB w="720" cap="flat" cmpd="sng" algn="ctr">
-                      <a:solidFill>
-                        <a:srgbClr val="FFFFFF"/>
-                      </a:solidFill>
-                      <a:prstDash val="solid"/>
-                      <a:round/>
-                      <a:headEnd type="none" w="med" len="med"/>
-                      <a:tailEnd type="none" w="med" len="med"/>
-                    </a:lnB>
-                    <a:lnTlToBr>
-                      <a:noFill/>
-                    </a:lnTlToBr>
-                    <a:lnBlToTr>
-                      <a:noFill/>
-                    </a:lnBlToTr>
-                    <a:solidFill>
-                      <a:srgbClr val="CCD1E1"/>
-                    </a:solidFill>
-                  </a:tcPr>
+                  <a:tcPr marL="53410" marR="53410" marT="29262" marB="27126" horzOverflow="overflow"/>
                 </a:tc>
                 <a:extLst>
                   <a:ext uri="{0D108BD9-81ED-4DB2-BD59-A6C34878D82A}">
@@ -14208,69 +13467,31 @@
                         </a:tabLst>
                       </a:pPr>
                       <a:r>
-                        <a:rPr kumimoji="0" lang="pt-BR" altLang="pt-BR" sz="1100" b="0" i="0" u="none" strike="noStrike" cap="none" normalizeH="0" baseline="0" dirty="0">
+                        <a:rPr kumimoji="0" lang="pt-BR" altLang="pt-BR" sz="1100" u="none" strike="noStrike" cap="none" normalizeH="0" baseline="0" dirty="0">
                           <a:ln>
                             <a:noFill/>
                           </a:ln>
-                          <a:solidFill>
-                            <a:srgbClr val="000000"/>
-                          </a:solidFill>
                           <a:effectLst/>
                           <a:latin typeface="Arial" panose="020B0604020202020204" pitchFamily="34" charset="0"/>
-                          <a:ea typeface="MS PGothic" panose="020B0600070205080204" pitchFamily="34" charset="-128"/>
                           <a:cs typeface="Arial" panose="020B0604020202020204" pitchFamily="34" charset="0"/>
                         </a:rPr>
-                        <a:t>2. Informar o valor , o tipo de lançamento recorrente, descrição, selecionar a categoria, selecionar a opção alerta mas não informar  quanto tempo antes deve ser alertado  e finalizar o procedimento escolhendo “Salvar”.</a:t>
+                        <a:t>2. Informa os dados solicitados para a notificação sem informar o tempo e finalizar o procedimento escolhendo “Salvar”.</a:t>
                       </a:r>
+                      <a:endParaRPr kumimoji="0" lang="pt-BR" altLang="pt-BR" sz="1100" b="0" i="0" u="none" strike="noStrike" cap="none" normalizeH="0" baseline="0" dirty="0">
+                        <a:ln>
+                          <a:noFill/>
+                        </a:ln>
+                        <a:solidFill>
+                          <a:schemeClr val="tx1"/>
+                        </a:solidFill>
+                        <a:effectLst/>
+                        <a:latin typeface="Arial" panose="020B0604020202020204" pitchFamily="34" charset="0"/>
+                        <a:ea typeface="MS PGothic" panose="020B0600070205080204" pitchFamily="34" charset="-128"/>
+                        <a:cs typeface="Arial" panose="020B0604020202020204" pitchFamily="34" charset="0"/>
+                      </a:endParaRPr>
                     </a:p>
                   </a:txBody>
-                  <a:tcPr marL="53410" marR="53410" marT="29262" marB="27126" horzOverflow="overflow">
-                    <a:lnL w="720" cap="flat" cmpd="sng" algn="ctr">
-                      <a:solidFill>
-                        <a:srgbClr val="FFFFFF"/>
-                      </a:solidFill>
-                      <a:prstDash val="solid"/>
-                      <a:round/>
-                      <a:headEnd type="none" w="med" len="med"/>
-                      <a:tailEnd type="none" w="med" len="med"/>
-                    </a:lnL>
-                    <a:lnR w="720" cap="flat" cmpd="sng" algn="ctr">
-                      <a:solidFill>
-                        <a:srgbClr val="FFFFFF"/>
-                      </a:solidFill>
-                      <a:prstDash val="solid"/>
-                      <a:round/>
-                      <a:headEnd type="none" w="med" len="med"/>
-                      <a:tailEnd type="none" w="med" len="med"/>
-                    </a:lnR>
-                    <a:lnT w="720" cap="flat" cmpd="sng" algn="ctr">
-                      <a:solidFill>
-                        <a:srgbClr val="FFFFFF"/>
-                      </a:solidFill>
-                      <a:prstDash val="solid"/>
-                      <a:round/>
-                      <a:headEnd type="none" w="med" len="med"/>
-                      <a:tailEnd type="none" w="med" len="med"/>
-                    </a:lnT>
-                    <a:lnB w="720" cap="flat" cmpd="sng" algn="ctr">
-                      <a:solidFill>
-                        <a:srgbClr val="FFFFFF"/>
-                      </a:solidFill>
-                      <a:prstDash val="solid"/>
-                      <a:round/>
-                      <a:headEnd type="none" w="med" len="med"/>
-                      <a:tailEnd type="none" w="med" len="med"/>
-                    </a:lnB>
-                    <a:lnTlToBr>
-                      <a:noFill/>
-                    </a:lnTlToBr>
-                    <a:lnBlToTr>
-                      <a:noFill/>
-                    </a:lnBlToTr>
-                    <a:solidFill>
-                      <a:srgbClr val="E8E9F1"/>
-                    </a:solidFill>
-                  </a:tcPr>
+                  <a:tcPr marL="53410" marR="53410" marT="29262" marB="27126" horzOverflow="overflow"/>
                 </a:tc>
                 <a:tc>
                   <a:txBody>
@@ -14664,69 +13885,31 @@
                         </a:tabLst>
                       </a:pPr>
                       <a:r>
-                        <a:rPr kumimoji="0" lang="pt-BR" altLang="pt-BR" sz="1100" b="0" i="0" u="none" strike="noStrike" cap="none" normalizeH="0" baseline="0" dirty="0">
+                        <a:rPr kumimoji="0" lang="pt-BR" altLang="pt-BR" sz="1100" u="none" strike="noStrike" cap="none" normalizeH="0" baseline="0" dirty="0">
                           <a:ln>
                             <a:noFill/>
                           </a:ln>
-                          <a:solidFill>
-                            <a:srgbClr val="000000"/>
-                          </a:solidFill>
                           <a:effectLst/>
                           <a:latin typeface="Arial" panose="020B0604020202020204" pitchFamily="34" charset="0"/>
-                          <a:ea typeface="MS PGothic" panose="020B0600070205080204" pitchFamily="34" charset="-128"/>
                           <a:cs typeface="Arial" panose="020B0604020202020204" pitchFamily="34" charset="0"/>
                         </a:rPr>
-                        <a:t>Aparece uma tela com a seguinte mensagem: “Faltou informar quantidade de ‘Tempo’. Informe o ‘Tempo’ ”.</a:t>
+                        <a:t>Aparece uma tela com a seguinte mensagem: “Faltou informar o tempo da notificação”.</a:t>
                       </a:r>
+                      <a:endParaRPr kumimoji="0" lang="pt-BR" altLang="pt-BR" sz="1100" b="0" i="0" u="none" strike="noStrike" cap="none" normalizeH="0" baseline="0" dirty="0">
+                        <a:ln>
+                          <a:noFill/>
+                        </a:ln>
+                        <a:solidFill>
+                          <a:schemeClr val="tx1"/>
+                        </a:solidFill>
+                        <a:effectLst/>
+                        <a:latin typeface="Arial" panose="020B0604020202020204" pitchFamily="34" charset="0"/>
+                        <a:ea typeface="MS PGothic" panose="020B0600070205080204" pitchFamily="34" charset="-128"/>
+                        <a:cs typeface="Arial" panose="020B0604020202020204" pitchFamily="34" charset="0"/>
+                      </a:endParaRPr>
                     </a:p>
                   </a:txBody>
-                  <a:tcPr marL="53410" marR="53410" marT="29262" marB="27126" horzOverflow="overflow">
-                    <a:lnL w="720" cap="flat" cmpd="sng" algn="ctr">
-                      <a:solidFill>
-                        <a:srgbClr val="FFFFFF"/>
-                      </a:solidFill>
-                      <a:prstDash val="solid"/>
-                      <a:round/>
-                      <a:headEnd type="none" w="med" len="med"/>
-                      <a:tailEnd type="none" w="med" len="med"/>
-                    </a:lnL>
-                    <a:lnR w="720" cap="flat" cmpd="sng" algn="ctr">
-                      <a:solidFill>
-                        <a:srgbClr val="FFFFFF"/>
-                      </a:solidFill>
-                      <a:prstDash val="solid"/>
-                      <a:round/>
-                      <a:headEnd type="none" w="med" len="med"/>
-                      <a:tailEnd type="none" w="med" len="med"/>
-                    </a:lnR>
-                    <a:lnT w="720" cap="flat" cmpd="sng" algn="ctr">
-                      <a:solidFill>
-                        <a:srgbClr val="FFFFFF"/>
-                      </a:solidFill>
-                      <a:prstDash val="solid"/>
-                      <a:round/>
-                      <a:headEnd type="none" w="med" len="med"/>
-                      <a:tailEnd type="none" w="med" len="med"/>
-                    </a:lnT>
-                    <a:lnB w="720" cap="flat" cmpd="sng" algn="ctr">
-                      <a:solidFill>
-                        <a:srgbClr val="FFFFFF"/>
-                      </a:solidFill>
-                      <a:prstDash val="solid"/>
-                      <a:round/>
-                      <a:headEnd type="none" w="med" len="med"/>
-                      <a:tailEnd type="none" w="med" len="med"/>
-                    </a:lnB>
-                    <a:lnTlToBr>
-                      <a:noFill/>
-                    </a:lnTlToBr>
-                    <a:lnBlToTr>
-                      <a:noFill/>
-                    </a:lnBlToTr>
-                    <a:solidFill>
-                      <a:srgbClr val="E8E9F1"/>
-                    </a:solidFill>
-                  </a:tcPr>
+                  <a:tcPr marL="53410" marR="53410" marT="29262" marB="27126" horzOverflow="overflow"/>
                 </a:tc>
                 <a:extLst>
                   <a:ext uri="{0D108BD9-81ED-4DB2-BD59-A6C34878D82A}">
@@ -14813,7 +13996,7 @@
           <p:nvPr>
             <p:extLst>
               <p:ext uri="{D42A27DB-BD31-4B8C-83A1-F6EECF244321}">
-                <p14:modId xmlns:p14="http://schemas.microsoft.com/office/powerpoint/2010/main" val="1264730600"/>
+                <p14:modId xmlns:p14="http://schemas.microsoft.com/office/powerpoint/2010/main" val="3504444761"/>
               </p:ext>
             </p:extLst>
           </p:nvPr>
@@ -14825,7 +14008,9 @@
         <a:graphic>
           <a:graphicData uri="http://schemas.openxmlformats.org/drawingml/2006/table">
             <a:tbl>
-              <a:tblPr/>
+              <a:tblPr>
+                <a:tableStyleId>{69CF1AB2-1976-4502-BF36-3FF5EA218861}</a:tableStyleId>
+              </a:tblPr>
               <a:tblGrid>
                 <a:gridCol w="2610155">
                   <a:extLst>
@@ -15235,63 +14420,31 @@
                         </a:tabLst>
                       </a:pPr>
                       <a:r>
-                        <a:rPr kumimoji="0" lang="pt-BR" altLang="pt-BR" sz="1100" b="0" i="0" u="none" strike="noStrike" cap="none" normalizeH="0" baseline="0" dirty="0">
+                        <a:rPr kumimoji="0" lang="pt-BR" altLang="pt-BR" sz="1100" u="none" strike="noStrike" cap="none" normalizeH="0" baseline="0" dirty="0">
                           <a:ln>
                             <a:noFill/>
                           </a:ln>
-                          <a:solidFill>
-                            <a:srgbClr val="FFFFFF"/>
-                          </a:solidFill>
                           <a:effectLst/>
                           <a:latin typeface="Arial" panose="020B0604020202020204" pitchFamily="34" charset="0"/>
-                          <a:ea typeface="MS PGothic" panose="020B0600070205080204" pitchFamily="34" charset="-128"/>
                           <a:cs typeface="Arial" panose="020B0604020202020204" pitchFamily="34" charset="0"/>
                         </a:rPr>
                         <a:t>CT07.4 – Notificação com tempo determinado.</a:t>
                       </a:r>
+                      <a:endParaRPr kumimoji="0" lang="pt-BR" altLang="pt-BR" sz="1100" b="0" i="0" u="none" strike="noStrike" cap="none" normalizeH="0" baseline="0" dirty="0">
+                        <a:ln>
+                          <a:noFill/>
+                        </a:ln>
+                        <a:solidFill>
+                          <a:schemeClr val="tx1"/>
+                        </a:solidFill>
+                        <a:effectLst/>
+                        <a:latin typeface="Arial" panose="020B0604020202020204" pitchFamily="34" charset="0"/>
+                        <a:ea typeface="MS PGothic" panose="020B0600070205080204" pitchFamily="34" charset="-128"/>
+                        <a:cs typeface="Arial" panose="020B0604020202020204" pitchFamily="34" charset="0"/>
+                      </a:endParaRPr>
                     </a:p>
                   </a:txBody>
-                  <a:tcPr marL="53410" marR="53410" marT="29903" marB="27126" horzOverflow="overflow">
-                    <a:lnL w="720" cap="flat" cmpd="sng" algn="ctr">
-                      <a:solidFill>
-                        <a:srgbClr val="FFFFFF"/>
-                      </a:solidFill>
-                      <a:prstDash val="solid"/>
-                      <a:round/>
-                      <a:headEnd type="none" w="med" len="med"/>
-                      <a:tailEnd type="none" w="med" len="med"/>
-                    </a:lnL>
-                    <a:lnR>
-                      <a:noFill/>
-                    </a:lnR>
-                    <a:lnT w="720" cap="flat" cmpd="sng" algn="ctr">
-                      <a:solidFill>
-                        <a:srgbClr val="FFFFFF"/>
-                      </a:solidFill>
-                      <a:prstDash val="solid"/>
-                      <a:round/>
-                      <a:headEnd type="none" w="med" len="med"/>
-                      <a:tailEnd type="none" w="med" len="med"/>
-                    </a:lnT>
-                    <a:lnB w="720" cap="flat" cmpd="sng" algn="ctr">
-                      <a:solidFill>
-                        <a:srgbClr val="FFFFFF"/>
-                      </a:solidFill>
-                      <a:prstDash val="solid"/>
-                      <a:round/>
-                      <a:headEnd type="none" w="med" len="med"/>
-                      <a:tailEnd type="none" w="med" len="med"/>
-                    </a:lnB>
-                    <a:lnTlToBr>
-                      <a:noFill/>
-                    </a:lnTlToBr>
-                    <a:lnBlToTr>
-                      <a:noFill/>
-                    </a:lnBlToTr>
-                    <a:solidFill>
-                      <a:srgbClr val="80B5E2"/>
-                    </a:solidFill>
-                  </a:tcPr>
+                  <a:tcPr marL="53410" marR="53410" marT="29903" marB="27126" horzOverflow="overflow"/>
                 </a:tc>
                 <a:tc hMerge="1">
                   <a:txBody>
@@ -15702,63 +14855,31 @@
                         </a:tabLst>
                       </a:pPr>
                       <a:r>
-                        <a:rPr kumimoji="0" lang="pt-BR" altLang="pt-BR" sz="1100" b="0" i="0" u="none" strike="noStrike" cap="none" normalizeH="0" baseline="0" dirty="0">
+                        <a:rPr kumimoji="0" lang="pt-BR" altLang="pt-BR" sz="1100" u="none" strike="noStrike" cap="none" normalizeH="0" baseline="0" dirty="0">
                           <a:ln>
                             <a:noFill/>
                           </a:ln>
-                          <a:solidFill>
-                            <a:srgbClr val="000000"/>
-                          </a:solidFill>
                           <a:effectLst/>
                           <a:latin typeface="Arial" panose="020B0604020202020204" pitchFamily="34" charset="0"/>
-                          <a:ea typeface="MS PGothic" panose="020B0600070205080204" pitchFamily="34" charset="-128"/>
                           <a:cs typeface="Arial" panose="020B0604020202020204" pitchFamily="34" charset="0"/>
                         </a:rPr>
                         <a:t>Pré-condição: O usuário deve estar autenticado no sistema.</a:t>
                       </a:r>
+                      <a:endParaRPr kumimoji="0" lang="pt-BR" altLang="pt-BR" sz="1100" b="0" i="0" u="none" strike="noStrike" cap="none" normalizeH="0" baseline="0" dirty="0">
+                        <a:ln>
+                          <a:noFill/>
+                        </a:ln>
+                        <a:solidFill>
+                          <a:schemeClr val="tx1"/>
+                        </a:solidFill>
+                        <a:effectLst/>
+                        <a:latin typeface="Arial" panose="020B0604020202020204" pitchFamily="34" charset="0"/>
+                        <a:ea typeface="MS PGothic" panose="020B0600070205080204" pitchFamily="34" charset="-128"/>
+                        <a:cs typeface="Arial" panose="020B0604020202020204" pitchFamily="34" charset="0"/>
+                      </a:endParaRPr>
                     </a:p>
                   </a:txBody>
-                  <a:tcPr marL="53410" marR="53410" marT="29903" marB="27126" horzOverflow="overflow">
-                    <a:lnL w="720" cap="flat" cmpd="sng" algn="ctr">
-                      <a:solidFill>
-                        <a:srgbClr val="FFFFFF"/>
-                      </a:solidFill>
-                      <a:prstDash val="solid"/>
-                      <a:round/>
-                      <a:headEnd type="none" w="med" len="med"/>
-                      <a:tailEnd type="none" w="med" len="med"/>
-                    </a:lnL>
-                    <a:lnR>
-                      <a:noFill/>
-                    </a:lnR>
-                    <a:lnT w="720" cap="flat" cmpd="sng" algn="ctr">
-                      <a:solidFill>
-                        <a:srgbClr val="FFFFFF"/>
-                      </a:solidFill>
-                      <a:prstDash val="solid"/>
-                      <a:round/>
-                      <a:headEnd type="none" w="med" len="med"/>
-                      <a:tailEnd type="none" w="med" len="med"/>
-                    </a:lnT>
-                    <a:lnB w="720" cap="flat" cmpd="sng" algn="ctr">
-                      <a:solidFill>
-                        <a:srgbClr val="FFFFFF"/>
-                      </a:solidFill>
-                      <a:prstDash val="solid"/>
-                      <a:round/>
-                      <a:headEnd type="none" w="med" len="med"/>
-                      <a:tailEnd type="none" w="med" len="med"/>
-                    </a:lnB>
-                    <a:lnTlToBr>
-                      <a:noFill/>
-                    </a:lnTlToBr>
-                    <a:lnBlToTr>
-                      <a:noFill/>
-                    </a:lnBlToTr>
-                    <a:solidFill>
-                      <a:srgbClr val="CCD1E1"/>
-                    </a:solidFill>
-                  </a:tcPr>
+                  <a:tcPr marL="53410" marR="53410" marT="29903" marB="27126" horzOverflow="overflow"/>
                 </a:tc>
                 <a:tc hMerge="1">
                   <a:txBody>
@@ -16169,69 +15290,31 @@
                         </a:tabLst>
                       </a:pPr>
                       <a:r>
-                        <a:rPr kumimoji="0" lang="pt-BR" altLang="pt-BR" sz="1100" b="0" i="1" u="none" strike="noStrike" cap="none" normalizeH="0" baseline="0" dirty="0">
+                        <a:rPr kumimoji="0" lang="pt-BR" altLang="pt-BR" sz="1100" u="none" strike="noStrike" cap="none" normalizeH="0" baseline="0" dirty="0">
                           <a:ln>
                             <a:noFill/>
                           </a:ln>
-                          <a:solidFill>
-                            <a:srgbClr val="2469A6"/>
-                          </a:solidFill>
                           <a:effectLst/>
                           <a:latin typeface="Arial" panose="020B0604020202020204" pitchFamily="34" charset="0"/>
-                          <a:ea typeface="MS PGothic" panose="020B0600070205080204" pitchFamily="34" charset="-128"/>
                           <a:cs typeface="Arial" panose="020B0604020202020204" pitchFamily="34" charset="0"/>
                         </a:rPr>
                         <a:t>Procedimentos</a:t>
                       </a:r>
+                      <a:endParaRPr kumimoji="0" lang="pt-BR" altLang="pt-BR" sz="1100" b="0" i="1" u="none" strike="noStrike" cap="none" normalizeH="0" baseline="0" dirty="0">
+                        <a:ln>
+                          <a:noFill/>
+                        </a:ln>
+                        <a:solidFill>
+                          <a:schemeClr val="tx1"/>
+                        </a:solidFill>
+                        <a:effectLst/>
+                        <a:latin typeface="Arial" panose="020B0604020202020204" pitchFamily="34" charset="0"/>
+                        <a:ea typeface="MS PGothic" panose="020B0600070205080204" pitchFamily="34" charset="-128"/>
+                        <a:cs typeface="Arial" panose="020B0604020202020204" pitchFamily="34" charset="0"/>
+                      </a:endParaRPr>
                     </a:p>
                   </a:txBody>
-                  <a:tcPr marL="53410" marR="53410" marT="29476" marB="27126" horzOverflow="overflow">
-                    <a:lnL w="720" cap="flat" cmpd="sng" algn="ctr">
-                      <a:solidFill>
-                        <a:srgbClr val="FFFFFF"/>
-                      </a:solidFill>
-                      <a:prstDash val="solid"/>
-                      <a:round/>
-                      <a:headEnd type="none" w="med" len="med"/>
-                      <a:tailEnd type="none" w="med" len="med"/>
-                    </a:lnL>
-                    <a:lnR w="720" cap="flat" cmpd="sng" algn="ctr">
-                      <a:solidFill>
-                        <a:srgbClr val="FFFFFF"/>
-                      </a:solidFill>
-                      <a:prstDash val="solid"/>
-                      <a:round/>
-                      <a:headEnd type="none" w="med" len="med"/>
-                      <a:tailEnd type="none" w="med" len="med"/>
-                    </a:lnR>
-                    <a:lnT w="720" cap="flat" cmpd="sng" algn="ctr">
-                      <a:solidFill>
-                        <a:srgbClr val="FFFFFF"/>
-                      </a:solidFill>
-                      <a:prstDash val="solid"/>
-                      <a:round/>
-                      <a:headEnd type="none" w="med" len="med"/>
-                      <a:tailEnd type="none" w="med" len="med"/>
-                    </a:lnT>
-                    <a:lnB w="720" cap="flat" cmpd="sng" algn="ctr">
-                      <a:solidFill>
-                        <a:srgbClr val="FFFFFF"/>
-                      </a:solidFill>
-                      <a:prstDash val="solid"/>
-                      <a:round/>
-                      <a:headEnd type="none" w="med" len="med"/>
-                      <a:tailEnd type="none" w="med" len="med"/>
-                    </a:lnB>
-                    <a:lnTlToBr>
-                      <a:noFill/>
-                    </a:lnTlToBr>
-                    <a:lnBlToTr>
-                      <a:noFill/>
-                    </a:lnBlToTr>
-                    <a:solidFill>
-                      <a:srgbClr val="E8E9F1"/>
-                    </a:solidFill>
-                  </a:tcPr>
+                  <a:tcPr marL="53410" marR="53410" marT="29476" marB="27126" horzOverflow="overflow"/>
                 </a:tc>
                 <a:tc>
                   <a:txBody>
@@ -16625,63 +15708,31 @@
                         </a:tabLst>
                       </a:pPr>
                       <a:r>
-                        <a:rPr kumimoji="0" lang="pt-BR" altLang="pt-BR" sz="1100" b="0" i="1" u="none" strike="noStrike" cap="none" normalizeH="0" baseline="0">
+                        <a:rPr kumimoji="0" lang="pt-BR" altLang="pt-BR" sz="1100" u="none" strike="noStrike" cap="none" normalizeH="0" baseline="0">
                           <a:ln>
                             <a:noFill/>
                           </a:ln>
-                          <a:solidFill>
-                            <a:srgbClr val="2469A6"/>
-                          </a:solidFill>
                           <a:effectLst/>
                           <a:latin typeface="Arial" panose="020B0604020202020204" pitchFamily="34" charset="0"/>
-                          <a:ea typeface="MS PGothic" panose="020B0600070205080204" pitchFamily="34" charset="-128"/>
                           <a:cs typeface="Arial" panose="020B0604020202020204" pitchFamily="34" charset="0"/>
                         </a:rPr>
                         <a:t>Resultado Esperado</a:t>
                       </a:r>
+                      <a:endParaRPr kumimoji="0" lang="pt-BR" altLang="pt-BR" sz="1100" b="0" i="1" u="none" strike="noStrike" cap="none" normalizeH="0" baseline="0">
+                        <a:ln>
+                          <a:noFill/>
+                        </a:ln>
+                        <a:solidFill>
+                          <a:schemeClr val="tx1"/>
+                        </a:solidFill>
+                        <a:effectLst/>
+                        <a:latin typeface="Arial" panose="020B0604020202020204" pitchFamily="34" charset="0"/>
+                        <a:ea typeface="MS PGothic" panose="020B0600070205080204" pitchFamily="34" charset="-128"/>
+                        <a:cs typeface="Arial" panose="020B0604020202020204" pitchFamily="34" charset="0"/>
+                      </a:endParaRPr>
                     </a:p>
                   </a:txBody>
-                  <a:tcPr marL="53410" marR="53410" marT="29476" marB="27126" horzOverflow="overflow">
-                    <a:lnL w="720" cap="flat" cmpd="sng" algn="ctr">
-                      <a:solidFill>
-                        <a:srgbClr val="FFFFFF"/>
-                      </a:solidFill>
-                      <a:prstDash val="solid"/>
-                      <a:round/>
-                      <a:headEnd type="none" w="med" len="med"/>
-                      <a:tailEnd type="none" w="med" len="med"/>
-                    </a:lnL>
-                    <a:lnR w="720" cap="flat" cmpd="sng" algn="ctr">
-                      <a:solidFill>
-                        <a:srgbClr val="FFFFFF"/>
-                      </a:solidFill>
-                      <a:prstDash val="solid"/>
-                      <a:round/>
-                      <a:headEnd type="none" w="med" len="med"/>
-                      <a:tailEnd type="none" w="med" len="med"/>
-                    </a:lnR>
-                    <a:lnT>
-                      <a:noFill/>
-                    </a:lnT>
-                    <a:lnB w="720" cap="flat" cmpd="sng" algn="ctr">
-                      <a:solidFill>
-                        <a:srgbClr val="FFFFFF"/>
-                      </a:solidFill>
-                      <a:prstDash val="solid"/>
-                      <a:round/>
-                      <a:headEnd type="none" w="med" len="med"/>
-                      <a:tailEnd type="none" w="med" len="med"/>
-                    </a:lnB>
-                    <a:lnTlToBr>
-                      <a:noFill/>
-                    </a:lnTlToBr>
-                    <a:lnBlToTr>
-                      <a:noFill/>
-                    </a:lnBlToTr>
-                    <a:solidFill>
-                      <a:srgbClr val="E8E9F1"/>
-                    </a:solidFill>
-                  </a:tcPr>
+                  <a:tcPr marL="53410" marR="53410" marT="29476" marB="27126" horzOverflow="overflow"/>
                 </a:tc>
                 <a:extLst>
                   <a:ext uri="{0D108BD9-81ED-4DB2-BD59-A6C34878D82A}">
@@ -17080,71 +16131,33 @@
                           <a:tab pos="8534400" algn="l"/>
                           <a:tab pos="8983663" algn="l"/>
                         </a:tabLst>
+                        <a:defRPr/>
                       </a:pPr>
                       <a:r>
-                        <a:rPr kumimoji="0" lang="pt-BR" altLang="pt-BR" sz="1100" b="0" i="0" u="none" strike="noStrike" cap="none" normalizeH="0" baseline="0" dirty="0">
+                        <a:rPr kumimoji="0" lang="pt-BR" altLang="pt-BR" sz="1100" u="none" strike="noStrike" cap="none" normalizeH="0" baseline="0" dirty="0">
                           <a:ln>
                             <a:noFill/>
                           </a:ln>
-                          <a:solidFill>
-                            <a:srgbClr val="000000"/>
-                          </a:solidFill>
                           <a:effectLst/>
                           <a:latin typeface="Arial" panose="020B0604020202020204" pitchFamily="34" charset="0"/>
-                          <a:ea typeface="MS PGothic" panose="020B0600070205080204" pitchFamily="34" charset="-128"/>
                           <a:cs typeface="Arial" panose="020B0604020202020204" pitchFamily="34" charset="0"/>
                         </a:rPr>
-                        <a:t>1. Escolher a opção “Adicionar Lançamento”</a:t>
+                        <a:t>1. Escolher a opção “Criar Lançamento”.</a:t>
                       </a:r>
+                      <a:endParaRPr kumimoji="0" lang="pt-BR" altLang="pt-BR" sz="1100" u="none" strike="noStrike" cap="none" normalizeH="0" baseline="0" dirty="0">
+                        <a:ln>
+                          <a:noFill/>
+                        </a:ln>
+                        <a:solidFill>
+                          <a:schemeClr val="tx1"/>
+                        </a:solidFill>
+                        <a:effectLst/>
+                        <a:latin typeface="Arial" panose="020B0604020202020204" pitchFamily="34" charset="0"/>
+                        <a:cs typeface="Arial" panose="020B0604020202020204" pitchFamily="34" charset="0"/>
+                      </a:endParaRPr>
                     </a:p>
                   </a:txBody>
-                  <a:tcPr marL="53410" marR="53410" marT="29262" marB="27126" horzOverflow="overflow">
-                    <a:lnL w="720" cap="flat" cmpd="sng" algn="ctr">
-                      <a:solidFill>
-                        <a:srgbClr val="FFFFFF"/>
-                      </a:solidFill>
-                      <a:prstDash val="solid"/>
-                      <a:round/>
-                      <a:headEnd type="none" w="med" len="med"/>
-                      <a:tailEnd type="none" w="med" len="med"/>
-                    </a:lnL>
-                    <a:lnR w="720" cap="flat" cmpd="sng" algn="ctr">
-                      <a:solidFill>
-                        <a:srgbClr val="FFFFFF"/>
-                      </a:solidFill>
-                      <a:prstDash val="solid"/>
-                      <a:round/>
-                      <a:headEnd type="none" w="med" len="med"/>
-                      <a:tailEnd type="none" w="med" len="med"/>
-                    </a:lnR>
-                    <a:lnT w="720" cap="flat" cmpd="sng" algn="ctr">
-                      <a:solidFill>
-                        <a:srgbClr val="FFFFFF"/>
-                      </a:solidFill>
-                      <a:prstDash val="solid"/>
-                      <a:round/>
-                      <a:headEnd type="none" w="med" len="med"/>
-                      <a:tailEnd type="none" w="med" len="med"/>
-                    </a:lnT>
-                    <a:lnB w="720" cap="flat" cmpd="sng" algn="ctr">
-                      <a:solidFill>
-                        <a:srgbClr val="FFFFFF"/>
-                      </a:solidFill>
-                      <a:prstDash val="solid"/>
-                      <a:round/>
-                      <a:headEnd type="none" w="med" len="med"/>
-                      <a:tailEnd type="none" w="med" len="med"/>
-                    </a:lnB>
-                    <a:lnTlToBr>
-                      <a:noFill/>
-                    </a:lnTlToBr>
-                    <a:lnBlToTr>
-                      <a:noFill/>
-                    </a:lnBlToTr>
-                    <a:solidFill>
-                      <a:srgbClr val="CCD1E1"/>
-                    </a:solidFill>
-                  </a:tcPr>
+                  <a:tcPr marL="53410" marR="53410" marT="29262" marB="27126" horzOverflow="overflow"/>
                 </a:tc>
                 <a:tc>
                   <a:txBody>
@@ -17538,69 +16551,31 @@
                         </a:tabLst>
                       </a:pPr>
                       <a:r>
-                        <a:rPr kumimoji="0" lang="pt-BR" altLang="pt-BR" sz="1100" b="0" i="0" u="none" strike="noStrike" cap="none" normalizeH="0" baseline="0">
+                        <a:rPr kumimoji="0" lang="pt-BR" altLang="pt-BR" sz="1100" u="none" strike="noStrike" cap="none" normalizeH="0" baseline="0">
                           <a:ln>
                             <a:noFill/>
                           </a:ln>
-                          <a:solidFill>
-                            <a:srgbClr val="000000"/>
-                          </a:solidFill>
                           <a:effectLst/>
                           <a:latin typeface="Arial" panose="020B0604020202020204" pitchFamily="34" charset="0"/>
-                          <a:ea typeface="MS PGothic" panose="020B0600070205080204" pitchFamily="34" charset="-128"/>
                           <a:cs typeface="Arial" panose="020B0604020202020204" pitchFamily="34" charset="0"/>
                         </a:rPr>
                         <a:t>Deve aparecer uma tela solicitando as informações do lancamento.</a:t>
                       </a:r>
+                      <a:endParaRPr kumimoji="0" lang="pt-BR" altLang="pt-BR" sz="1100" b="0" i="0" u="none" strike="noStrike" cap="none" normalizeH="0" baseline="0">
+                        <a:ln>
+                          <a:noFill/>
+                        </a:ln>
+                        <a:solidFill>
+                          <a:schemeClr val="tx1"/>
+                        </a:solidFill>
+                        <a:effectLst/>
+                        <a:latin typeface="Arial" panose="020B0604020202020204" pitchFamily="34" charset="0"/>
+                        <a:ea typeface="MS PGothic" panose="020B0600070205080204" pitchFamily="34" charset="-128"/>
+                        <a:cs typeface="Arial" panose="020B0604020202020204" pitchFamily="34" charset="0"/>
+                      </a:endParaRPr>
                     </a:p>
                   </a:txBody>
-                  <a:tcPr marL="53410" marR="53410" marT="29262" marB="27126" horzOverflow="overflow">
-                    <a:lnL w="720" cap="flat" cmpd="sng" algn="ctr">
-                      <a:solidFill>
-                        <a:srgbClr val="FFFFFF"/>
-                      </a:solidFill>
-                      <a:prstDash val="solid"/>
-                      <a:round/>
-                      <a:headEnd type="none" w="med" len="med"/>
-                      <a:tailEnd type="none" w="med" len="med"/>
-                    </a:lnL>
-                    <a:lnR w="720" cap="flat" cmpd="sng" algn="ctr">
-                      <a:solidFill>
-                        <a:srgbClr val="FFFFFF"/>
-                      </a:solidFill>
-                      <a:prstDash val="solid"/>
-                      <a:round/>
-                      <a:headEnd type="none" w="med" len="med"/>
-                      <a:tailEnd type="none" w="med" len="med"/>
-                    </a:lnR>
-                    <a:lnT w="720" cap="flat" cmpd="sng" algn="ctr">
-                      <a:solidFill>
-                        <a:srgbClr val="FFFFFF"/>
-                      </a:solidFill>
-                      <a:prstDash val="solid"/>
-                      <a:round/>
-                      <a:headEnd type="none" w="med" len="med"/>
-                      <a:tailEnd type="none" w="med" len="med"/>
-                    </a:lnT>
-                    <a:lnB w="720" cap="flat" cmpd="sng" algn="ctr">
-                      <a:solidFill>
-                        <a:srgbClr val="FFFFFF"/>
-                      </a:solidFill>
-                      <a:prstDash val="solid"/>
-                      <a:round/>
-                      <a:headEnd type="none" w="med" len="med"/>
-                      <a:tailEnd type="none" w="med" len="med"/>
-                    </a:lnB>
-                    <a:lnTlToBr>
-                      <a:noFill/>
-                    </a:lnTlToBr>
-                    <a:lnBlToTr>
-                      <a:noFill/>
-                    </a:lnBlToTr>
-                    <a:solidFill>
-                      <a:srgbClr val="CCD1E1"/>
-                    </a:solidFill>
-                  </a:tcPr>
+                  <a:tcPr marL="53410" marR="53410" marT="29262" marB="27126" horzOverflow="overflow"/>
                 </a:tc>
                 <a:extLst>
                   <a:ext uri="{0D108BD9-81ED-4DB2-BD59-A6C34878D82A}">
@@ -18001,69 +16976,31 @@
                         </a:tabLst>
                       </a:pPr>
                       <a:r>
-                        <a:rPr kumimoji="0" lang="pt-BR" altLang="pt-BR" sz="1100" b="0" i="0" u="none" strike="noStrike" cap="none" normalizeH="0" baseline="0" dirty="0">
+                        <a:rPr kumimoji="0" lang="pt-BR" altLang="pt-BR" sz="1100" u="none" strike="noStrike" cap="none" normalizeH="0" baseline="0" dirty="0">
                           <a:ln>
                             <a:noFill/>
                           </a:ln>
-                          <a:solidFill>
-                            <a:srgbClr val="000000"/>
-                          </a:solidFill>
                           <a:effectLst/>
                           <a:latin typeface="Arial" panose="020B0604020202020204" pitchFamily="34" charset="0"/>
-                          <a:ea typeface="MS PGothic" panose="020B0600070205080204" pitchFamily="34" charset="-128"/>
                           <a:cs typeface="Arial" panose="020B0604020202020204" pitchFamily="34" charset="0"/>
                         </a:rPr>
-                        <a:t>2. Informar o valor , o tipo de lançamento recorrente, descrição, selecionar a categoria, selecionar a opção alerta e informar  quanto tempo antes deve ser alertado  e finalizar o procedimento escolhendo “Salvar”.</a:t>
+                        <a:t>2. Informa os dados solicitados para a notificação e finalizar o procedimento escolhendo “Salvar”.</a:t>
                       </a:r>
+                      <a:endParaRPr kumimoji="0" lang="pt-BR" altLang="pt-BR" sz="1100" b="0" i="0" u="none" strike="noStrike" cap="none" normalizeH="0" baseline="0" dirty="0">
+                        <a:ln>
+                          <a:noFill/>
+                        </a:ln>
+                        <a:solidFill>
+                          <a:schemeClr val="tx1"/>
+                        </a:solidFill>
+                        <a:effectLst/>
+                        <a:latin typeface="Arial" panose="020B0604020202020204" pitchFamily="34" charset="0"/>
+                        <a:ea typeface="MS PGothic" panose="020B0600070205080204" pitchFamily="34" charset="-128"/>
+                        <a:cs typeface="Arial" panose="020B0604020202020204" pitchFamily="34" charset="0"/>
+                      </a:endParaRPr>
                     </a:p>
                   </a:txBody>
-                  <a:tcPr marL="53410" marR="53410" marT="29262" marB="27126" horzOverflow="overflow">
-                    <a:lnL w="720" cap="flat" cmpd="sng" algn="ctr">
-                      <a:solidFill>
-                        <a:srgbClr val="FFFFFF"/>
-                      </a:solidFill>
-                      <a:prstDash val="solid"/>
-                      <a:round/>
-                      <a:headEnd type="none" w="med" len="med"/>
-                      <a:tailEnd type="none" w="med" len="med"/>
-                    </a:lnL>
-                    <a:lnR w="720" cap="flat" cmpd="sng" algn="ctr">
-                      <a:solidFill>
-                        <a:srgbClr val="FFFFFF"/>
-                      </a:solidFill>
-                      <a:prstDash val="solid"/>
-                      <a:round/>
-                      <a:headEnd type="none" w="med" len="med"/>
-                      <a:tailEnd type="none" w="med" len="med"/>
-                    </a:lnR>
-                    <a:lnT w="720" cap="flat" cmpd="sng" algn="ctr">
-                      <a:solidFill>
-                        <a:srgbClr val="FFFFFF"/>
-                      </a:solidFill>
-                      <a:prstDash val="solid"/>
-                      <a:round/>
-                      <a:headEnd type="none" w="med" len="med"/>
-                      <a:tailEnd type="none" w="med" len="med"/>
-                    </a:lnT>
-                    <a:lnB w="720" cap="flat" cmpd="sng" algn="ctr">
-                      <a:solidFill>
-                        <a:srgbClr val="FFFFFF"/>
-                      </a:solidFill>
-                      <a:prstDash val="solid"/>
-                      <a:round/>
-                      <a:headEnd type="none" w="med" len="med"/>
-                      <a:tailEnd type="none" w="med" len="med"/>
-                    </a:lnB>
-                    <a:lnTlToBr>
-                      <a:noFill/>
-                    </a:lnTlToBr>
-                    <a:lnBlToTr>
-                      <a:noFill/>
-                    </a:lnBlToTr>
-                    <a:solidFill>
-                      <a:srgbClr val="E8E9F1"/>
-                    </a:solidFill>
-                  </a:tcPr>
+                  <a:tcPr marL="53410" marR="53410" marT="29262" marB="27126" horzOverflow="overflow"/>
                 </a:tc>
                 <a:tc>
                   <a:txBody>
@@ -18420,7 +17357,7 @@
                     <a:p>
                       <a:pPr marL="0" marR="0" lvl="0" indent="0" algn="just" defTabSz="449263" rtl="0" eaLnBrk="1" fontAlgn="base" latinLnBrk="0" hangingPunct="1">
                         <a:lnSpc>
-                          <a:spcPct val="80000"/>
+                          <a:spcPct val="100000"/>
                         </a:lnSpc>
                         <a:spcBef>
                           <a:spcPct val="0"/>
@@ -18457,69 +17394,49 @@
                         </a:tabLst>
                       </a:pPr>
                       <a:r>
-                        <a:rPr kumimoji="0" lang="pt-BR" altLang="pt-BR" sz="1100" b="0" i="0" u="none" strike="noStrike" cap="none" normalizeH="0" baseline="0" dirty="0">
+                        <a:rPr kumimoji="0" lang="pt-BR" altLang="pt-BR" sz="1100" u="none" strike="noStrike" cap="none" normalizeH="0" baseline="0" dirty="0">
                           <a:ln>
                             <a:noFill/>
                           </a:ln>
-                          <a:solidFill>
-                            <a:srgbClr val="000000"/>
-                          </a:solidFill>
                           <a:effectLst/>
                           <a:latin typeface="Arial" panose="020B0604020202020204" pitchFamily="34" charset="0"/>
-                          <a:ea typeface="MS PGothic" panose="020B0600070205080204" pitchFamily="34" charset="-128"/>
                           <a:cs typeface="Arial" panose="020B0604020202020204" pitchFamily="34" charset="0"/>
                         </a:rPr>
-                        <a:t>Aparece uma tela com a seguinte mensagem: “Lançamento registrado com sucesso”.</a:t>
+                        <a:t>Aparece uma tela com a seguinte mensagem: “</a:t>
                       </a:r>
+                      <a:r>
+                        <a:rPr lang="pt-BR" sz="1100" dirty="0">
+                          <a:latin typeface="Arial" panose="020B0604020202020204" pitchFamily="34" charset="0"/>
+                          <a:cs typeface="Arial" panose="020B0604020202020204" pitchFamily="34" charset="0"/>
+                        </a:rPr>
+                        <a:t>Salvo com sucesso!</a:t>
+                      </a:r>
+                      <a:r>
+                        <a:rPr kumimoji="0" lang="pt-BR" altLang="pt-BR" sz="1100" u="none" strike="noStrike" cap="none" normalizeH="0" baseline="0" dirty="0">
+                          <a:ln>
+                            <a:noFill/>
+                          </a:ln>
+                          <a:effectLst/>
+                          <a:latin typeface="Arial" panose="020B0604020202020204" pitchFamily="34" charset="0"/>
+                          <a:cs typeface="Arial" panose="020B0604020202020204" pitchFamily="34" charset="0"/>
+                        </a:rPr>
+                        <a:t>”.</a:t>
+                      </a:r>
+                      <a:endParaRPr kumimoji="0" lang="pt-BR" altLang="pt-BR" sz="1100" b="0" i="0" u="none" strike="noStrike" cap="none" normalizeH="0" baseline="0" dirty="0">
+                        <a:ln>
+                          <a:noFill/>
+                        </a:ln>
+                        <a:solidFill>
+                          <a:schemeClr val="tx1"/>
+                        </a:solidFill>
+                        <a:effectLst/>
+                        <a:latin typeface="Arial" panose="020B0604020202020204" pitchFamily="34" charset="0"/>
+                        <a:ea typeface="MS PGothic" panose="020B0600070205080204" pitchFamily="34" charset="-128"/>
+                        <a:cs typeface="Arial" panose="020B0604020202020204" pitchFamily="34" charset="0"/>
+                      </a:endParaRPr>
                     </a:p>
                   </a:txBody>
-                  <a:tcPr marL="53410" marR="53410" marT="29262" marB="27126" horzOverflow="overflow">
-                    <a:lnL w="720" cap="flat" cmpd="sng" algn="ctr">
-                      <a:solidFill>
-                        <a:srgbClr val="FFFFFF"/>
-                      </a:solidFill>
-                      <a:prstDash val="solid"/>
-                      <a:round/>
-                      <a:headEnd type="none" w="med" len="med"/>
-                      <a:tailEnd type="none" w="med" len="med"/>
-                    </a:lnL>
-                    <a:lnR w="720" cap="flat" cmpd="sng" algn="ctr">
-                      <a:solidFill>
-                        <a:srgbClr val="FFFFFF"/>
-                      </a:solidFill>
-                      <a:prstDash val="solid"/>
-                      <a:round/>
-                      <a:headEnd type="none" w="med" len="med"/>
-                      <a:tailEnd type="none" w="med" len="med"/>
-                    </a:lnR>
-                    <a:lnT w="720" cap="flat" cmpd="sng" algn="ctr">
-                      <a:solidFill>
-                        <a:srgbClr val="FFFFFF"/>
-                      </a:solidFill>
-                      <a:prstDash val="solid"/>
-                      <a:round/>
-                      <a:headEnd type="none" w="med" len="med"/>
-                      <a:tailEnd type="none" w="med" len="med"/>
-                    </a:lnT>
-                    <a:lnB w="720" cap="flat" cmpd="sng" algn="ctr">
-                      <a:solidFill>
-                        <a:srgbClr val="FFFFFF"/>
-                      </a:solidFill>
-                      <a:prstDash val="solid"/>
-                      <a:round/>
-                      <a:headEnd type="none" w="med" len="med"/>
-                      <a:tailEnd type="none" w="med" len="med"/>
-                    </a:lnB>
-                    <a:lnTlToBr>
-                      <a:noFill/>
-                    </a:lnTlToBr>
-                    <a:lnBlToTr>
-                      <a:noFill/>
-                    </a:lnBlToTr>
-                    <a:solidFill>
-                      <a:srgbClr val="E8E9F1"/>
-                    </a:solidFill>
-                  </a:tcPr>
+                  <a:tcPr marL="53410" marR="53410" marT="29262" marB="27126" horzOverflow="overflow"/>
                 </a:tc>
                 <a:extLst>
                   <a:ext uri="{0D108BD9-81ED-4DB2-BD59-A6C34878D82A}">

</xml_diff>